<commit_message>
only put the choices and colored for emotiona faces
</commit_message>
<xml_diff>
--- a/public/js/tasks/emotional_faces/media/Emotional_Faces_Instructions.pptx
+++ b/public/js/tasks/emotional_faces/media/Emotional_Faces_Instructions.pptx
@@ -5,18 +5,19 @@
     <p:sldMasterId id="2147483660" r:id="rId1"/>
   </p:sldMasterIdLst>
   <p:notesMasterIdLst>
-    <p:notesMasterId r:id="rId11"/>
+    <p:notesMasterId r:id="rId12"/>
   </p:notesMasterIdLst>
   <p:sldIdLst>
     <p:sldId id="498" r:id="rId2"/>
     <p:sldId id="495" r:id="rId3"/>
-    <p:sldId id="535" r:id="rId4"/>
-    <p:sldId id="536" r:id="rId5"/>
-    <p:sldId id="538" r:id="rId6"/>
-    <p:sldId id="539" r:id="rId7"/>
-    <p:sldId id="537" r:id="rId8"/>
-    <p:sldId id="526" r:id="rId9"/>
-    <p:sldId id="534" r:id="rId10"/>
+    <p:sldId id="540" r:id="rId4"/>
+    <p:sldId id="535" r:id="rId5"/>
+    <p:sldId id="536" r:id="rId6"/>
+    <p:sldId id="538" r:id="rId7"/>
+    <p:sldId id="539" r:id="rId8"/>
+    <p:sldId id="537" r:id="rId9"/>
+    <p:sldId id="526" r:id="rId10"/>
+    <p:sldId id="534" r:id="rId11"/>
   </p:sldIdLst>
   <p:sldSz cx="12192000" cy="6858000"/>
   <p:notesSz cx="6858000" cy="9144000"/>
@@ -122,6 +123,7 @@
           <p14:sldIdLst>
             <p14:sldId id="498"/>
             <p14:sldId id="495"/>
+            <p14:sldId id="540"/>
             <p14:sldId id="535"/>
             <p14:sldId id="536"/>
             <p14:sldId id="538"/>
@@ -237,7 +239,7 @@
           <a:p>
             <a:fld id="{5ACDFB13-8C7E-2148-B293-047F9641DD71}" type="datetimeFigureOut">
               <a:rPr lang="en-US" smtClean="0"/>
-              <a:t>8/9/2022</a:t>
+              <a:t>8/24/22</a:t>
             </a:fld>
             <a:endParaRPr lang="en-US" dirty="0"/>
           </a:p>
@@ -601,6 +603,155 @@
 </p:notes>
 </file>
 
+<file path=ppt/notesSlides/notesSlide10.xml><?xml version="1.0" encoding="utf-8"?>
+<p:notes xmlns:a="http://schemas.openxmlformats.org/drawingml/2006/main" xmlns:r="http://schemas.openxmlformats.org/officeDocument/2006/relationships" xmlns:p="http://schemas.openxmlformats.org/presentationml/2006/main">
+  <p:cSld>
+    <p:spTree>
+      <p:nvGrpSpPr>
+        <p:cNvPr id="1" name=""/>
+        <p:cNvGrpSpPr/>
+        <p:nvPr/>
+      </p:nvGrpSpPr>
+      <p:grpSpPr>
+        <a:xfrm>
+          <a:off x="0" y="0"/>
+          <a:ext cx="0" cy="0"/>
+          <a:chOff x="0" y="0"/>
+          <a:chExt cx="0" cy="0"/>
+        </a:xfrm>
+      </p:grpSpPr>
+      <p:sp>
+        <p:nvSpPr>
+          <p:cNvPr id="2" name="Slide Image Placeholder 1"/>
+          <p:cNvSpPr>
+            <a:spLocks noGrp="1" noRot="1" noChangeAspect="1"/>
+          </p:cNvSpPr>
+          <p:nvPr>
+            <p:ph type="sldImg"/>
+          </p:nvPr>
+        </p:nvSpPr>
+        <p:spPr>
+          <a:xfrm>
+            <a:off x="381000" y="685800"/>
+            <a:ext cx="6096000" cy="3429000"/>
+          </a:xfrm>
+        </p:spPr>
+      </p:sp>
+      <p:sp>
+        <p:nvSpPr>
+          <p:cNvPr id="3" name="Notes Placeholder 2"/>
+          <p:cNvSpPr>
+            <a:spLocks noGrp="1"/>
+          </p:cNvSpPr>
+          <p:nvPr>
+            <p:ph type="body" idx="1"/>
+          </p:nvPr>
+        </p:nvSpPr>
+        <p:spPr/>
+        <p:txBody>
+          <a:bodyPr/>
+          <a:lstStyle/>
+          <a:p>
+            <a:endParaRPr lang="en-US" dirty="0"/>
+          </a:p>
+        </p:txBody>
+      </p:sp>
+      <p:sp>
+        <p:nvSpPr>
+          <p:cNvPr id="4" name="Slide Number Placeholder 3"/>
+          <p:cNvSpPr>
+            <a:spLocks noGrp="1"/>
+          </p:cNvSpPr>
+          <p:nvPr>
+            <p:ph type="sldNum" sz="quarter" idx="10"/>
+          </p:nvPr>
+        </p:nvSpPr>
+        <p:spPr/>
+        <p:txBody>
+          <a:bodyPr/>
+          <a:lstStyle/>
+          <a:p>
+            <a:pPr marL="0" marR="0" lvl="0" indent="0" algn="r" defTabSz="457200" rtl="0" eaLnBrk="1" fontAlgn="auto" latinLnBrk="0" hangingPunct="1">
+              <a:lnSpc>
+                <a:spcPct val="100000"/>
+              </a:lnSpc>
+              <a:spcBef>
+                <a:spcPts val="0"/>
+              </a:spcBef>
+              <a:spcAft>
+                <a:spcPts val="0"/>
+              </a:spcAft>
+              <a:buClrTx/>
+              <a:buSzTx/>
+              <a:buFontTx/>
+              <a:buNone/>
+              <a:tabLst/>
+              <a:defRPr/>
+            </a:pPr>
+            <a:fld id="{BCAE12D7-AE97-9243-8341-9A20FCA5A307}" type="slidenum">
+              <a:rPr kumimoji="0" lang="en-US" sz="1200" b="0" i="0" u="none" strike="noStrike" kern="1200" cap="none" spc="0" normalizeH="0" baseline="0" noProof="0" smtClean="0">
+                <a:ln>
+                  <a:noFill/>
+                </a:ln>
+                <a:solidFill>
+                  <a:prstClr val="black"/>
+                </a:solidFill>
+                <a:effectLst/>
+                <a:uLnTx/>
+                <a:uFillTx/>
+                <a:latin typeface="Calibri"/>
+                <a:ea typeface="+mn-ea"/>
+                <a:cs typeface="+mn-cs"/>
+              </a:rPr>
+              <a:pPr marL="0" marR="0" lvl="0" indent="0" algn="r" defTabSz="457200" rtl="0" eaLnBrk="1" fontAlgn="auto" latinLnBrk="0" hangingPunct="1">
+                <a:lnSpc>
+                  <a:spcPct val="100000"/>
+                </a:lnSpc>
+                <a:spcBef>
+                  <a:spcPts val="0"/>
+                </a:spcBef>
+                <a:spcAft>
+                  <a:spcPts val="0"/>
+                </a:spcAft>
+                <a:buClrTx/>
+                <a:buSzTx/>
+                <a:buFontTx/>
+                <a:buNone/>
+                <a:tabLst/>
+                <a:defRPr/>
+              </a:pPr>
+              <a:t>10</a:t>
+            </a:fld>
+            <a:endParaRPr kumimoji="0" lang="en-US" sz="1200" b="0" i="0" u="none" strike="noStrike" kern="1200" cap="none" spc="0" normalizeH="0" baseline="0" noProof="0">
+              <a:ln>
+                <a:noFill/>
+              </a:ln>
+              <a:solidFill>
+                <a:prstClr val="black"/>
+              </a:solidFill>
+              <a:effectLst/>
+              <a:uLnTx/>
+              <a:uFillTx/>
+              <a:latin typeface="Calibri"/>
+              <a:ea typeface="+mn-ea"/>
+              <a:cs typeface="+mn-cs"/>
+            </a:endParaRPr>
+          </a:p>
+        </p:txBody>
+      </p:sp>
+    </p:spTree>
+    <p:extLst>
+      <p:ext uri="{BB962C8B-B14F-4D97-AF65-F5344CB8AC3E}">
+        <p14:creationId xmlns:p14="http://schemas.microsoft.com/office/powerpoint/2010/main" val="4266951294"/>
+      </p:ext>
+    </p:extLst>
+  </p:cSld>
+  <p:clrMapOvr>
+    <a:masterClrMapping/>
+  </p:clrMapOvr>
+</p:notes>
+</file>
+
 <file path=ppt/notesSlides/notesSlide2.xml><?xml version="1.0" encoding="utf-8"?>
 <p:notes xmlns:a="http://schemas.openxmlformats.org/drawingml/2006/main" xmlns:r="http://schemas.openxmlformats.org/officeDocument/2006/relationships" xmlns:p="http://schemas.openxmlformats.org/presentationml/2006/main">
   <p:cSld>
@@ -777,7 +928,7 @@
     </p:spTree>
     <p:extLst>
       <p:ext uri="{BB962C8B-B14F-4D97-AF65-F5344CB8AC3E}">
-        <p14:creationId xmlns:p14="http://schemas.microsoft.com/office/powerpoint/2010/main" val="2205437122"/>
+        <p14:creationId xmlns:p14="http://schemas.microsoft.com/office/powerpoint/2010/main" val="3100449011"/>
       </p:ext>
     </p:extLst>
   </p:cSld>
@@ -870,7 +1021,7 @@
     </p:spTree>
     <p:extLst>
       <p:ext uri="{BB962C8B-B14F-4D97-AF65-F5344CB8AC3E}">
-        <p14:creationId xmlns:p14="http://schemas.microsoft.com/office/powerpoint/2010/main" val="2561113701"/>
+        <p14:creationId xmlns:p14="http://schemas.microsoft.com/office/powerpoint/2010/main" val="2205437122"/>
       </p:ext>
     </p:extLst>
   </p:cSld>
@@ -952,78 +1103,18 @@
           <a:bodyPr/>
           <a:lstStyle/>
           <a:p>
-            <a:pPr marL="0" marR="0" lvl="0" indent="0" algn="r" defTabSz="457200" rtl="0" eaLnBrk="1" fontAlgn="auto" latinLnBrk="0" hangingPunct="1">
-              <a:lnSpc>
-                <a:spcPct val="100000"/>
-              </a:lnSpc>
-              <a:spcBef>
-                <a:spcPts val="0"/>
-              </a:spcBef>
-              <a:spcAft>
-                <a:spcPts val="0"/>
-              </a:spcAft>
-              <a:buClrTx/>
-              <a:buSzTx/>
-              <a:buFontTx/>
-              <a:buNone/>
-              <a:tabLst/>
-              <a:defRPr/>
-            </a:pPr>
             <a:fld id="{BCAE12D7-AE97-9243-8341-9A20FCA5A307}" type="slidenum">
-              <a:rPr kumimoji="0" lang="en-US" sz="1200" b="0" i="0" u="none" strike="noStrike" kern="1200" cap="none" spc="0" normalizeH="0" baseline="0" noProof="0" smtClean="0">
-                <a:ln>
-                  <a:noFill/>
-                </a:ln>
-                <a:solidFill>
-                  <a:prstClr val="black"/>
-                </a:solidFill>
-                <a:effectLst/>
-                <a:uLnTx/>
-                <a:uFillTx/>
-                <a:latin typeface="Calibri"/>
-                <a:ea typeface="+mn-ea"/>
-                <a:cs typeface="+mn-cs"/>
-              </a:rPr>
-              <a:pPr marL="0" marR="0" lvl="0" indent="0" algn="r" defTabSz="457200" rtl="0" eaLnBrk="1" fontAlgn="auto" latinLnBrk="0" hangingPunct="1">
-                <a:lnSpc>
-                  <a:spcPct val="100000"/>
-                </a:lnSpc>
-                <a:spcBef>
-                  <a:spcPts val="0"/>
-                </a:spcBef>
-                <a:spcAft>
-                  <a:spcPts val="0"/>
-                </a:spcAft>
-                <a:buClrTx/>
-                <a:buSzTx/>
-                <a:buFontTx/>
-                <a:buNone/>
-                <a:tabLst/>
-                <a:defRPr/>
-              </a:pPr>
+              <a:rPr lang="en-US" smtClean="0"/>
               <a:t>5</a:t>
             </a:fld>
-            <a:endParaRPr kumimoji="0" lang="en-US" sz="1200" b="0" i="0" u="none" strike="noStrike" kern="1200" cap="none" spc="0" normalizeH="0" baseline="0" noProof="0">
-              <a:ln>
-                <a:noFill/>
-              </a:ln>
-              <a:solidFill>
-                <a:prstClr val="black"/>
-              </a:solidFill>
-              <a:effectLst/>
-              <a:uLnTx/>
-              <a:uFillTx/>
-              <a:latin typeface="Calibri"/>
-              <a:ea typeface="+mn-ea"/>
-              <a:cs typeface="+mn-cs"/>
-            </a:endParaRPr>
+            <a:endParaRPr lang="en-US"/>
           </a:p>
         </p:txBody>
       </p:sp>
     </p:spTree>
     <p:extLst>
       <p:ext uri="{BB962C8B-B14F-4D97-AF65-F5344CB8AC3E}">
-        <p14:creationId xmlns:p14="http://schemas.microsoft.com/office/powerpoint/2010/main" val="3584668351"/>
+        <p14:creationId xmlns:p14="http://schemas.microsoft.com/office/powerpoint/2010/main" val="2561113701"/>
       </p:ext>
     </p:extLst>
   </p:cSld>
@@ -1176,7 +1267,7 @@
     </p:spTree>
     <p:extLst>
       <p:ext uri="{BB962C8B-B14F-4D97-AF65-F5344CB8AC3E}">
-        <p14:creationId xmlns:p14="http://schemas.microsoft.com/office/powerpoint/2010/main" val="3522958140"/>
+        <p14:creationId xmlns:p14="http://schemas.microsoft.com/office/powerpoint/2010/main" val="3584668351"/>
       </p:ext>
     </p:extLst>
   </p:cSld>
@@ -1329,7 +1420,7 @@
     </p:spTree>
     <p:extLst>
       <p:ext uri="{BB962C8B-B14F-4D97-AF65-F5344CB8AC3E}">
-        <p14:creationId xmlns:p14="http://schemas.microsoft.com/office/powerpoint/2010/main" val="3299715422"/>
+        <p14:creationId xmlns:p14="http://schemas.microsoft.com/office/powerpoint/2010/main" val="3522958140"/>
       </p:ext>
     </p:extLst>
   </p:cSld>
@@ -1388,6 +1479,10 @@
           <a:bodyPr/>
           <a:lstStyle/>
           <a:p>
+            <a:r>
+              <a:rPr lang="en-US" baseline="0" dirty="0"/>
+              <a:t>.</a:t>
+            </a:r>
             <a:endParaRPr lang="en-US" dirty="0"/>
           </a:p>
         </p:txBody>
@@ -1478,7 +1573,7 @@
     </p:spTree>
     <p:extLst>
       <p:ext uri="{BB962C8B-B14F-4D97-AF65-F5344CB8AC3E}">
-        <p14:creationId xmlns:p14="http://schemas.microsoft.com/office/powerpoint/2010/main" val="1319536521"/>
+        <p14:creationId xmlns:p14="http://schemas.microsoft.com/office/powerpoint/2010/main" val="3299715422"/>
       </p:ext>
     </p:extLst>
   </p:cSld>
@@ -1627,7 +1722,7 @@
     </p:spTree>
     <p:extLst>
       <p:ext uri="{BB962C8B-B14F-4D97-AF65-F5344CB8AC3E}">
-        <p14:creationId xmlns:p14="http://schemas.microsoft.com/office/powerpoint/2010/main" val="4266951294"/>
+        <p14:creationId xmlns:p14="http://schemas.microsoft.com/office/powerpoint/2010/main" val="1319536521"/>
       </p:ext>
     </p:extLst>
   </p:cSld>
@@ -1816,7 +1911,7 @@
           <a:p>
             <a:fld id="{E69A4D3A-6EF8-7448-AC6F-AD52FEDAA6A8}" type="datetimeFigureOut">
               <a:rPr lang="en-US" smtClean="0"/>
-              <a:t>8/9/2022</a:t>
+              <a:t>8/24/22</a:t>
             </a:fld>
             <a:endParaRPr lang="en-US" dirty="0"/>
           </a:p>
@@ -1984,7 +2079,7 @@
           <a:p>
             <a:fld id="{E69A4D3A-6EF8-7448-AC6F-AD52FEDAA6A8}" type="datetimeFigureOut">
               <a:rPr lang="en-US" smtClean="0"/>
-              <a:t>8/9/2022</a:t>
+              <a:t>8/24/22</a:t>
             </a:fld>
             <a:endParaRPr lang="en-US" dirty="0"/>
           </a:p>
@@ -2162,7 +2257,7 @@
           <a:p>
             <a:fld id="{E69A4D3A-6EF8-7448-AC6F-AD52FEDAA6A8}" type="datetimeFigureOut">
               <a:rPr lang="en-US" smtClean="0"/>
-              <a:t>8/9/2022</a:t>
+              <a:t>8/24/22</a:t>
             </a:fld>
             <a:endParaRPr lang="en-US" dirty="0"/>
           </a:p>
@@ -2330,7 +2425,7 @@
           <a:p>
             <a:fld id="{E69A4D3A-6EF8-7448-AC6F-AD52FEDAA6A8}" type="datetimeFigureOut">
               <a:rPr lang="en-US" smtClean="0"/>
-              <a:t>8/9/2022</a:t>
+              <a:t>8/24/22</a:t>
             </a:fld>
             <a:endParaRPr lang="en-US" dirty="0"/>
           </a:p>
@@ -2575,7 +2670,7 @@
           <a:p>
             <a:fld id="{E69A4D3A-6EF8-7448-AC6F-AD52FEDAA6A8}" type="datetimeFigureOut">
               <a:rPr lang="en-US" smtClean="0"/>
-              <a:t>8/9/2022</a:t>
+              <a:t>8/24/22</a:t>
             </a:fld>
             <a:endParaRPr lang="en-US" dirty="0"/>
           </a:p>
@@ -2860,7 +2955,7 @@
           <a:p>
             <a:fld id="{E69A4D3A-6EF8-7448-AC6F-AD52FEDAA6A8}" type="datetimeFigureOut">
               <a:rPr lang="en-US" smtClean="0"/>
-              <a:t>8/9/2022</a:t>
+              <a:t>8/24/22</a:t>
             </a:fld>
             <a:endParaRPr lang="en-US" dirty="0"/>
           </a:p>
@@ -3279,7 +3374,7 @@
           <a:p>
             <a:fld id="{E69A4D3A-6EF8-7448-AC6F-AD52FEDAA6A8}" type="datetimeFigureOut">
               <a:rPr lang="en-US" smtClean="0"/>
-              <a:t>8/9/2022</a:t>
+              <a:t>8/24/22</a:t>
             </a:fld>
             <a:endParaRPr lang="en-US" dirty="0"/>
           </a:p>
@@ -3396,7 +3491,7 @@
           <a:p>
             <a:fld id="{E69A4D3A-6EF8-7448-AC6F-AD52FEDAA6A8}" type="datetimeFigureOut">
               <a:rPr lang="en-US" smtClean="0"/>
-              <a:t>8/9/2022</a:t>
+              <a:t>8/24/22</a:t>
             </a:fld>
             <a:endParaRPr lang="en-US" dirty="0"/>
           </a:p>
@@ -3491,7 +3586,7 @@
           <a:p>
             <a:fld id="{E69A4D3A-6EF8-7448-AC6F-AD52FEDAA6A8}" type="datetimeFigureOut">
               <a:rPr lang="en-US" smtClean="0"/>
-              <a:t>8/9/2022</a:t>
+              <a:t>8/24/22</a:t>
             </a:fld>
             <a:endParaRPr lang="en-US" dirty="0"/>
           </a:p>
@@ -3766,7 +3861,7 @@
           <a:p>
             <a:fld id="{E69A4D3A-6EF8-7448-AC6F-AD52FEDAA6A8}" type="datetimeFigureOut">
               <a:rPr lang="en-US" smtClean="0"/>
-              <a:t>8/9/2022</a:t>
+              <a:t>8/24/22</a:t>
             </a:fld>
             <a:endParaRPr lang="en-US" dirty="0"/>
           </a:p>
@@ -4021,7 +4116,7 @@
           <a:p>
             <a:fld id="{E69A4D3A-6EF8-7448-AC6F-AD52FEDAA6A8}" type="datetimeFigureOut">
               <a:rPr lang="en-US" smtClean="0"/>
-              <a:t>8/9/2022</a:t>
+              <a:t>8/24/22</a:t>
             </a:fld>
             <a:endParaRPr lang="en-US" dirty="0"/>
           </a:p>
@@ -4235,7 +4330,7 @@
           <a:p>
             <a:fld id="{E69A4D3A-6EF8-7448-AC6F-AD52FEDAA6A8}" type="datetimeFigureOut">
               <a:rPr lang="en-US" smtClean="0"/>
-              <a:t>8/9/2022</a:t>
+              <a:t>8/24/22</a:t>
             </a:fld>
             <a:endParaRPr lang="en-US" dirty="0"/>
           </a:p>
@@ -4971,6 +5066,407 @@
 </p:sld>
 </file>
 
+<file path=ppt/slides/slide10.xml><?xml version="1.0" encoding="utf-8"?>
+<p:sld xmlns:a="http://schemas.openxmlformats.org/drawingml/2006/main" xmlns:r="http://schemas.openxmlformats.org/officeDocument/2006/relationships" xmlns:p="http://schemas.openxmlformats.org/presentationml/2006/main">
+  <p:cSld>
+    <p:bg>
+      <p:bgPr>
+        <a:solidFill>
+          <a:schemeClr val="bg1"/>
+        </a:solidFill>
+        <a:effectLst/>
+      </p:bgPr>
+    </p:bg>
+    <p:spTree>
+      <p:nvGrpSpPr>
+        <p:cNvPr id="1" name=""/>
+        <p:cNvGrpSpPr/>
+        <p:nvPr/>
+      </p:nvGrpSpPr>
+      <p:grpSpPr>
+        <a:xfrm>
+          <a:off x="0" y="0"/>
+          <a:ext cx="0" cy="0"/>
+          <a:chOff x="0" y="0"/>
+          <a:chExt cx="0" cy="0"/>
+        </a:xfrm>
+      </p:grpSpPr>
+      <p:sp>
+        <p:nvSpPr>
+          <p:cNvPr id="15" name="Content Placeholder 2">
+            <a:extLst>
+              <a:ext uri="{FF2B5EF4-FFF2-40B4-BE49-F238E27FC236}">
+                <a16:creationId xmlns:a16="http://schemas.microsoft.com/office/drawing/2014/main" id="{BB089F57-6179-B14E-8148-2009637B51FB}"/>
+              </a:ext>
+            </a:extLst>
+          </p:cNvPr>
+          <p:cNvSpPr>
+            <a:spLocks noGrp="1"/>
+          </p:cNvSpPr>
+          <p:nvPr>
+            <p:ph idx="1"/>
+          </p:nvPr>
+        </p:nvSpPr>
+        <p:spPr>
+          <a:xfrm>
+            <a:off x="1264920" y="1065627"/>
+            <a:ext cx="9662159" cy="1804181"/>
+          </a:xfrm>
+        </p:spPr>
+        <p:txBody>
+          <a:bodyPr>
+            <a:noAutofit/>
+          </a:bodyPr>
+          <a:lstStyle/>
+          <a:p>
+            <a:pPr marL="0" indent="0" algn="ctr">
+              <a:buNone/>
+            </a:pPr>
+            <a:r>
+              <a:rPr lang="en-US" dirty="0"/>
+              <a:t>Great Job!</a:t>
+            </a:r>
+          </a:p>
+          <a:p>
+            <a:pPr marL="0" indent="0" algn="ctr">
+              <a:buNone/>
+            </a:pPr>
+            <a:r>
+              <a:rPr lang="en-US" dirty="0"/>
+              <a:t>Let’s begin the task.</a:t>
+            </a:r>
+          </a:p>
+          <a:p>
+            <a:pPr marL="0" indent="0" algn="ctr">
+              <a:buNone/>
+            </a:pPr>
+            <a:r>
+              <a:rPr lang="en-US" dirty="0"/>
+              <a:t>Good luck!</a:t>
+            </a:r>
+          </a:p>
+        </p:txBody>
+      </p:sp>
+      <p:sp>
+        <p:nvSpPr>
+          <p:cNvPr id="6" name="Title 3">
+            <a:extLst>
+              <a:ext uri="{FF2B5EF4-FFF2-40B4-BE49-F238E27FC236}">
+                <a16:creationId xmlns:a16="http://schemas.microsoft.com/office/drawing/2014/main" id="{BAAE0E0B-4974-DD4C-AAA7-9A9C12314860}"/>
+              </a:ext>
+            </a:extLst>
+          </p:cNvPr>
+          <p:cNvSpPr txBox="1">
+            <a:spLocks/>
+          </p:cNvSpPr>
+          <p:nvPr/>
+        </p:nvSpPr>
+        <p:spPr>
+          <a:xfrm>
+            <a:off x="3031351" y="3644440"/>
+            <a:ext cx="6111932" cy="656705"/>
+          </a:xfrm>
+          <a:prstGeom prst="rect">
+            <a:avLst/>
+          </a:prstGeom>
+        </p:spPr>
+        <p:txBody>
+          <a:bodyPr vert="horz" lIns="91440" tIns="45720" rIns="91440" bIns="45720" rtlCol="0" anchor="ctr">
+            <a:normAutofit/>
+          </a:bodyPr>
+          <a:lstStyle>
+            <a:lvl1pPr algn="ctr" defTabSz="914400" rtl="0" eaLnBrk="1" latinLnBrk="0" hangingPunct="1">
+              <a:spcBef>
+                <a:spcPct val="0"/>
+              </a:spcBef>
+              <a:buNone/>
+              <a:defRPr sz="4400" kern="1200">
+                <a:solidFill>
+                  <a:schemeClr val="tx1"/>
+                </a:solidFill>
+                <a:latin typeface="+mj-lt"/>
+                <a:ea typeface="+mj-ea"/>
+                <a:cs typeface="+mj-cs"/>
+              </a:defRPr>
+            </a:lvl1pPr>
+          </a:lstStyle>
+          <a:p>
+            <a:r>
+              <a:rPr lang="en-US" sz="3000" dirty="0">
+                <a:solidFill>
+                  <a:srgbClr val="FF0000"/>
+                </a:solidFill>
+              </a:rPr>
+              <a:t>PRESS THE RIGHT BUTTON TO </a:t>
+            </a:r>
+            <a:r>
+              <a:rPr lang="en-US" sz="3000" u="sng" dirty="0">
+                <a:solidFill>
+                  <a:srgbClr val="FF0000"/>
+                </a:solidFill>
+              </a:rPr>
+              <a:t>BEGIN</a:t>
+            </a:r>
+          </a:p>
+        </p:txBody>
+      </p:sp>
+      <p:sp>
+        <p:nvSpPr>
+          <p:cNvPr id="8" name="Subtitle 8">
+            <a:extLst>
+              <a:ext uri="{FF2B5EF4-FFF2-40B4-BE49-F238E27FC236}">
+                <a16:creationId xmlns:a16="http://schemas.microsoft.com/office/drawing/2014/main" id="{A055A16D-A8A0-3F4E-A40E-0DE76845C931}"/>
+              </a:ext>
+            </a:extLst>
+          </p:cNvPr>
+          <p:cNvSpPr txBox="1">
+            <a:spLocks/>
+          </p:cNvSpPr>
+          <p:nvPr/>
+        </p:nvSpPr>
+        <p:spPr>
+          <a:xfrm>
+            <a:off x="8981486" y="3479952"/>
+            <a:ext cx="1258017" cy="631765"/>
+          </a:xfrm>
+          <a:prstGeom prst="rect">
+            <a:avLst/>
+          </a:prstGeom>
+        </p:spPr>
+        <p:txBody>
+          <a:bodyPr vert="horz" lIns="91440" tIns="45720" rIns="91440" bIns="45720" rtlCol="0">
+            <a:normAutofit/>
+          </a:bodyPr>
+          <a:lstStyle>
+            <a:lvl1pPr marL="0" indent="0" algn="ctr" defTabSz="914400" rtl="0" eaLnBrk="1" latinLnBrk="0" hangingPunct="1">
+              <a:spcBef>
+                <a:spcPct val="20000"/>
+              </a:spcBef>
+              <a:buFont typeface="Arial" pitchFamily="34" charset="0"/>
+              <a:buNone/>
+              <a:defRPr sz="3200" kern="1200">
+                <a:solidFill>
+                  <a:schemeClr val="tx1">
+                    <a:tint val="75000"/>
+                  </a:schemeClr>
+                </a:solidFill>
+                <a:latin typeface="+mn-lt"/>
+                <a:ea typeface="+mn-ea"/>
+                <a:cs typeface="+mn-cs"/>
+              </a:defRPr>
+            </a:lvl1pPr>
+            <a:lvl2pPr marL="457200" indent="0" algn="ctr" defTabSz="914400" rtl="0" eaLnBrk="1" latinLnBrk="0" hangingPunct="1">
+              <a:spcBef>
+                <a:spcPct val="20000"/>
+              </a:spcBef>
+              <a:buFont typeface="Arial" pitchFamily="34" charset="0"/>
+              <a:buNone/>
+              <a:defRPr sz="2800" kern="1200">
+                <a:solidFill>
+                  <a:schemeClr val="tx1">
+                    <a:tint val="75000"/>
+                  </a:schemeClr>
+                </a:solidFill>
+                <a:latin typeface="+mn-lt"/>
+                <a:ea typeface="+mn-ea"/>
+                <a:cs typeface="+mn-cs"/>
+              </a:defRPr>
+            </a:lvl2pPr>
+            <a:lvl3pPr marL="914400" indent="0" algn="ctr" defTabSz="914400" rtl="0" eaLnBrk="1" latinLnBrk="0" hangingPunct="1">
+              <a:spcBef>
+                <a:spcPct val="20000"/>
+              </a:spcBef>
+              <a:buFont typeface="Arial" pitchFamily="34" charset="0"/>
+              <a:buNone/>
+              <a:defRPr sz="2400" kern="1200">
+                <a:solidFill>
+                  <a:schemeClr val="tx1">
+                    <a:tint val="75000"/>
+                  </a:schemeClr>
+                </a:solidFill>
+                <a:latin typeface="+mn-lt"/>
+                <a:ea typeface="+mn-ea"/>
+                <a:cs typeface="+mn-cs"/>
+              </a:defRPr>
+            </a:lvl3pPr>
+            <a:lvl4pPr marL="1371600" indent="0" algn="ctr" defTabSz="914400" rtl="0" eaLnBrk="1" latinLnBrk="0" hangingPunct="1">
+              <a:spcBef>
+                <a:spcPct val="20000"/>
+              </a:spcBef>
+              <a:buFont typeface="Arial" pitchFamily="34" charset="0"/>
+              <a:buNone/>
+              <a:defRPr sz="2000" kern="1200">
+                <a:solidFill>
+                  <a:schemeClr val="tx1">
+                    <a:tint val="75000"/>
+                  </a:schemeClr>
+                </a:solidFill>
+                <a:latin typeface="+mn-lt"/>
+                <a:ea typeface="+mn-ea"/>
+                <a:cs typeface="+mn-cs"/>
+              </a:defRPr>
+            </a:lvl4pPr>
+            <a:lvl5pPr marL="1828800" indent="0" algn="ctr" defTabSz="914400" rtl="0" eaLnBrk="1" latinLnBrk="0" hangingPunct="1">
+              <a:spcBef>
+                <a:spcPct val="20000"/>
+              </a:spcBef>
+              <a:buFont typeface="Arial" pitchFamily="34" charset="0"/>
+              <a:buNone/>
+              <a:defRPr sz="2000" kern="1200">
+                <a:solidFill>
+                  <a:schemeClr val="tx1">
+                    <a:tint val="75000"/>
+                  </a:schemeClr>
+                </a:solidFill>
+                <a:latin typeface="+mn-lt"/>
+                <a:ea typeface="+mn-ea"/>
+                <a:cs typeface="+mn-cs"/>
+              </a:defRPr>
+            </a:lvl5pPr>
+            <a:lvl6pPr marL="2286000" indent="0" algn="ctr" defTabSz="914400" rtl="0" eaLnBrk="1" latinLnBrk="0" hangingPunct="1">
+              <a:spcBef>
+                <a:spcPct val="20000"/>
+              </a:spcBef>
+              <a:buFont typeface="Arial" pitchFamily="34" charset="0"/>
+              <a:buNone/>
+              <a:defRPr sz="2000" kern="1200">
+                <a:solidFill>
+                  <a:schemeClr val="tx1">
+                    <a:tint val="75000"/>
+                  </a:schemeClr>
+                </a:solidFill>
+                <a:latin typeface="+mn-lt"/>
+                <a:ea typeface="+mn-ea"/>
+                <a:cs typeface="+mn-cs"/>
+              </a:defRPr>
+            </a:lvl6pPr>
+            <a:lvl7pPr marL="2743200" indent="0" algn="ctr" defTabSz="914400" rtl="0" eaLnBrk="1" latinLnBrk="0" hangingPunct="1">
+              <a:spcBef>
+                <a:spcPct val="20000"/>
+              </a:spcBef>
+              <a:buFont typeface="Arial" pitchFamily="34" charset="0"/>
+              <a:buNone/>
+              <a:defRPr sz="2000" kern="1200">
+                <a:solidFill>
+                  <a:schemeClr val="tx1">
+                    <a:tint val="75000"/>
+                  </a:schemeClr>
+                </a:solidFill>
+                <a:latin typeface="+mn-lt"/>
+                <a:ea typeface="+mn-ea"/>
+                <a:cs typeface="+mn-cs"/>
+              </a:defRPr>
+            </a:lvl7pPr>
+            <a:lvl8pPr marL="3200400" indent="0" algn="ctr" defTabSz="914400" rtl="0" eaLnBrk="1" latinLnBrk="0" hangingPunct="1">
+              <a:spcBef>
+                <a:spcPct val="20000"/>
+              </a:spcBef>
+              <a:buFont typeface="Arial" pitchFamily="34" charset="0"/>
+              <a:buNone/>
+              <a:defRPr sz="2000" kern="1200">
+                <a:solidFill>
+                  <a:schemeClr val="tx1">
+                    <a:tint val="75000"/>
+                  </a:schemeClr>
+                </a:solidFill>
+                <a:latin typeface="+mn-lt"/>
+                <a:ea typeface="+mn-ea"/>
+                <a:cs typeface="+mn-cs"/>
+              </a:defRPr>
+            </a:lvl8pPr>
+            <a:lvl9pPr marL="3657600" indent="0" algn="ctr" defTabSz="914400" rtl="0" eaLnBrk="1" latinLnBrk="0" hangingPunct="1">
+              <a:spcBef>
+                <a:spcPct val="20000"/>
+              </a:spcBef>
+              <a:buFont typeface="Arial" pitchFamily="34" charset="0"/>
+              <a:buNone/>
+              <a:defRPr sz="2000" kern="1200">
+                <a:solidFill>
+                  <a:schemeClr val="tx1">
+                    <a:tint val="75000"/>
+                  </a:schemeClr>
+                </a:solidFill>
+                <a:latin typeface="+mn-lt"/>
+                <a:ea typeface="+mn-ea"/>
+                <a:cs typeface="+mn-cs"/>
+              </a:defRPr>
+            </a:lvl9pPr>
+          </a:lstStyle>
+          <a:p>
+            <a:r>
+              <a:rPr lang="en-US" sz="1600" dirty="0">
+                <a:solidFill>
+                  <a:schemeClr val="tx1"/>
+                </a:solidFill>
+              </a:rPr>
+              <a:t>RIGHT</a:t>
+            </a:r>
+          </a:p>
+        </p:txBody>
+      </p:sp>
+      <p:sp>
+        <p:nvSpPr>
+          <p:cNvPr id="9" name="Right Arrow 8">
+            <a:extLst>
+              <a:ext uri="{FF2B5EF4-FFF2-40B4-BE49-F238E27FC236}">
+                <a16:creationId xmlns:a16="http://schemas.microsoft.com/office/drawing/2014/main" id="{ECC5C2B7-F559-DC43-B8E3-A629B8848CFA}"/>
+              </a:ext>
+            </a:extLst>
+          </p:cNvPr>
+          <p:cNvSpPr/>
+          <p:nvPr/>
+        </p:nvSpPr>
+        <p:spPr>
+          <a:xfrm>
+            <a:off x="9143283" y="3644440"/>
+            <a:ext cx="1258017" cy="631765"/>
+          </a:xfrm>
+          <a:prstGeom prst="rightArrow">
+            <a:avLst/>
+          </a:prstGeom>
+          <a:solidFill>
+            <a:schemeClr val="tx1"/>
+          </a:solidFill>
+          <a:ln>
+            <a:noFill/>
+          </a:ln>
+        </p:spPr>
+        <p:style>
+          <a:lnRef idx="1">
+            <a:schemeClr val="accent1"/>
+          </a:lnRef>
+          <a:fillRef idx="3">
+            <a:schemeClr val="accent1"/>
+          </a:fillRef>
+          <a:effectRef idx="2">
+            <a:schemeClr val="accent1"/>
+          </a:effectRef>
+          <a:fontRef idx="minor">
+            <a:schemeClr val="lt1"/>
+          </a:fontRef>
+        </p:style>
+        <p:txBody>
+          <a:bodyPr rtlCol="0" anchor="ctr"/>
+          <a:lstStyle/>
+          <a:p>
+            <a:pPr algn="ctr"/>
+            <a:endParaRPr lang="en-US"/>
+          </a:p>
+        </p:txBody>
+      </p:sp>
+    </p:spTree>
+    <p:extLst>
+      <p:ext uri="{BB962C8B-B14F-4D97-AF65-F5344CB8AC3E}">
+        <p14:creationId xmlns:p14="http://schemas.microsoft.com/office/powerpoint/2010/main" val="3361022600"/>
+      </p:ext>
+    </p:extLst>
+  </p:cSld>
+  <p:clrMapOvr>
+    <a:masterClrMapping/>
+  </p:clrMapOvr>
+</p:sld>
+</file>
+
 <file path=ppt/slides/slide2.xml><?xml version="1.0" encoding="utf-8"?>
 <p:sld xmlns:a="http://schemas.openxmlformats.org/drawingml/2006/main" xmlns:r="http://schemas.openxmlformats.org/officeDocument/2006/relationships" xmlns:p="http://schemas.openxmlformats.org/presentationml/2006/main">
   <p:cSld>
@@ -5060,8 +5556,8 @@
         </p:nvSpPr>
         <p:spPr>
           <a:xfrm>
-            <a:off x="840890" y="650531"/>
-            <a:ext cx="10510220" cy="5115568"/>
+            <a:off x="1152501" y="619569"/>
+            <a:ext cx="9886998" cy="3093491"/>
           </a:xfrm>
         </p:spPr>
         <p:txBody>
@@ -5079,12 +5575,6 @@
             </a:r>
           </a:p>
           <a:p>
-            <a:pPr marL="0" indent="0" algn="ctr">
-              <a:buNone/>
-            </a:pPr>
-            <a:endParaRPr lang="en-US" dirty="0"/>
-          </a:p>
-          <a:p>
             <a:pPr marL="0" indent="0">
               <a:buNone/>
             </a:pPr>
@@ -5114,48 +5604,6 @@
                 </a:solidFill>
               </a:rPr>
               <a:t>SADNESS</a:t>
-            </a:r>
-            <a:r>
-              <a:rPr lang="en-US" dirty="0"/>
-              <a:t>. </a:t>
-            </a:r>
-          </a:p>
-          <a:p>
-            <a:pPr marL="0" indent="0">
-              <a:buNone/>
-            </a:pPr>
-            <a:endParaRPr lang="en-US" dirty="0"/>
-          </a:p>
-          <a:p>
-            <a:pPr marL="0" indent="0">
-              <a:buNone/>
-            </a:pPr>
-            <a:r>
-              <a:rPr lang="en-US" dirty="0"/>
-              <a:t>Your job in the task is to indicate whether the face you see is </a:t>
-            </a:r>
-            <a:r>
-              <a:rPr lang="en-US" dirty="0">
-                <a:solidFill>
-                  <a:srgbClr val="FF0000"/>
-                </a:solidFill>
-              </a:rPr>
-              <a:t>angry</a:t>
-            </a:r>
-            <a:r>
-              <a:rPr lang="en-US" dirty="0"/>
-              <a:t> or </a:t>
-            </a:r>
-            <a:r>
-              <a:rPr lang="en-US" dirty="0">
-                <a:solidFill>
-                  <a:schemeClr val="bg2">
-                    <a:lumMod val="40000"/>
-                    <a:lumOff val="60000"/>
-                  </a:schemeClr>
-                </a:solidFill>
-              </a:rPr>
-              <a:t>sad</a:t>
             </a:r>
             <a:r>
               <a:rPr lang="en-US" dirty="0"/>
@@ -5442,6 +5890,145 @@
           <a:p>
             <a:pPr algn="ctr"/>
             <a:endParaRPr lang="en-US"/>
+          </a:p>
+        </p:txBody>
+      </p:sp>
+      <p:pic>
+        <p:nvPicPr>
+          <p:cNvPr id="4" name="Picture 3" descr="A picture containing text, person, posing&#10;&#10;Description automatically generated">
+            <a:extLst>
+              <a:ext uri="{FF2B5EF4-FFF2-40B4-BE49-F238E27FC236}">
+                <a16:creationId xmlns:a16="http://schemas.microsoft.com/office/drawing/2014/main" id="{34DB15D7-3F74-E54B-9287-6E86570B3FA3}"/>
+              </a:ext>
+            </a:extLst>
+          </p:cNvPr>
+          <p:cNvPicPr>
+            <a:picLocks noChangeAspect="1"/>
+          </p:cNvPicPr>
+          <p:nvPr/>
+        </p:nvPicPr>
+        <p:blipFill>
+          <a:blip r:embed="rId3"/>
+          <a:stretch>
+            <a:fillRect/>
+          </a:stretch>
+        </p:blipFill>
+        <p:spPr>
+          <a:xfrm>
+            <a:off x="6410929" y="2993969"/>
+            <a:ext cx="1437409" cy="1845667"/>
+          </a:xfrm>
+          <a:prstGeom prst="rect">
+            <a:avLst/>
+          </a:prstGeom>
+        </p:spPr>
+      </p:pic>
+      <p:pic>
+        <p:nvPicPr>
+          <p:cNvPr id="6" name="Picture 5" descr="A picture containing text, wall, person, person&#10;&#10;Description automatically generated">
+            <a:extLst>
+              <a:ext uri="{FF2B5EF4-FFF2-40B4-BE49-F238E27FC236}">
+                <a16:creationId xmlns:a16="http://schemas.microsoft.com/office/drawing/2014/main" id="{BE73B981-ABE7-B443-A789-020E8BD45282}"/>
+              </a:ext>
+            </a:extLst>
+          </p:cNvPr>
+          <p:cNvPicPr>
+            <a:picLocks noChangeAspect="1"/>
+          </p:cNvPicPr>
+          <p:nvPr/>
+        </p:nvPicPr>
+        <p:blipFill>
+          <a:blip r:embed="rId4"/>
+          <a:stretch>
+            <a:fillRect/>
+          </a:stretch>
+        </p:blipFill>
+        <p:spPr>
+          <a:xfrm>
+            <a:off x="3736649" y="2993969"/>
+            <a:ext cx="1437409" cy="1845667"/>
+          </a:xfrm>
+          <a:prstGeom prst="rect">
+            <a:avLst/>
+          </a:prstGeom>
+        </p:spPr>
+      </p:pic>
+      <p:sp>
+        <p:nvSpPr>
+          <p:cNvPr id="11" name="Rectangle 10">
+            <a:extLst>
+              <a:ext uri="{FF2B5EF4-FFF2-40B4-BE49-F238E27FC236}">
+                <a16:creationId xmlns:a16="http://schemas.microsoft.com/office/drawing/2014/main" id="{24DA3C16-DB9B-B843-9BEF-B43958D28553}"/>
+              </a:ext>
+            </a:extLst>
+          </p:cNvPr>
+          <p:cNvSpPr/>
+          <p:nvPr/>
+        </p:nvSpPr>
+        <p:spPr>
+          <a:xfrm>
+            <a:off x="3918099" y="4943668"/>
+            <a:ext cx="1074508" cy="461665"/>
+          </a:xfrm>
+          <a:prstGeom prst="rect">
+            <a:avLst/>
+          </a:prstGeom>
+        </p:spPr>
+        <p:txBody>
+          <a:bodyPr wrap="square">
+            <a:spAutoFit/>
+          </a:bodyPr>
+          <a:lstStyle/>
+          <a:p>
+            <a:pPr algn="ctr"/>
+            <a:r>
+              <a:rPr lang="en-US" sz="2400" dirty="0">
+                <a:solidFill>
+                  <a:srgbClr val="FF0000"/>
+                </a:solidFill>
+              </a:rPr>
+              <a:t>angry</a:t>
+            </a:r>
+            <a:endParaRPr lang="en-US" sz="2400" dirty="0"/>
+          </a:p>
+        </p:txBody>
+      </p:sp>
+      <p:sp>
+        <p:nvSpPr>
+          <p:cNvPr id="14" name="Rectangle 13">
+            <a:extLst>
+              <a:ext uri="{FF2B5EF4-FFF2-40B4-BE49-F238E27FC236}">
+                <a16:creationId xmlns:a16="http://schemas.microsoft.com/office/drawing/2014/main" id="{96F045BA-8250-E744-9791-C638F94805E3}"/>
+              </a:ext>
+            </a:extLst>
+          </p:cNvPr>
+          <p:cNvSpPr/>
+          <p:nvPr/>
+        </p:nvSpPr>
+        <p:spPr>
+          <a:xfrm>
+            <a:off x="6598307" y="4943669"/>
+            <a:ext cx="1074508" cy="461665"/>
+          </a:xfrm>
+          <a:prstGeom prst="rect">
+            <a:avLst/>
+          </a:prstGeom>
+        </p:spPr>
+        <p:txBody>
+          <a:bodyPr wrap="square">
+            <a:spAutoFit/>
+          </a:bodyPr>
+          <a:lstStyle/>
+          <a:p>
+            <a:pPr algn="ctr"/>
+            <a:r>
+              <a:rPr lang="en-US" sz="2400" dirty="0">
+                <a:solidFill>
+                  <a:srgbClr val="1D6BA9"/>
+                </a:solidFill>
+              </a:rPr>
+              <a:t>sad</a:t>
+            </a:r>
           </a:p>
         </p:txBody>
       </p:sp>
@@ -5547,8 +6134,8 @@
         </p:nvSpPr>
         <p:spPr>
           <a:xfrm>
-            <a:off x="840890" y="650531"/>
-            <a:ext cx="10510220" cy="5115568"/>
+            <a:off x="1398757" y="1006265"/>
+            <a:ext cx="9394486" cy="2639079"/>
           </a:xfrm>
         </p:spPr>
         <p:txBody>
@@ -5557,299 +6144,40 @@
           </a:bodyPr>
           <a:lstStyle/>
           <a:p>
-            <a:pPr marL="0" marR="0" lvl="0" indent="0" algn="l" defTabSz="914400" rtl="0" eaLnBrk="1" fontAlgn="auto" latinLnBrk="0" hangingPunct="1">
-              <a:lnSpc>
-                <a:spcPct val="100000"/>
-              </a:lnSpc>
-              <a:spcBef>
-                <a:spcPct val="20000"/>
-              </a:spcBef>
-              <a:spcAft>
-                <a:spcPts val="0"/>
-              </a:spcAft>
-              <a:buClrTx/>
-              <a:buSzTx/>
-              <a:buFont typeface="Arial" pitchFamily="34" charset="0"/>
-              <a:buNone/>
-              <a:tabLst/>
-              <a:defRPr/>
+            <a:pPr marL="0" indent="0">
+              <a:buNone/>
             </a:pPr>
             <a:r>
-              <a:rPr kumimoji="0" lang="en-US" sz="3200" b="0" i="0" u="none" strike="noStrike" kern="1200" cap="none" spc="0" normalizeH="0" baseline="0" noProof="0" dirty="0">
-                <a:ln>
-                  <a:noFill/>
-                </a:ln>
-                <a:solidFill>
-                  <a:prstClr val="white"/>
-                </a:solidFill>
-                <a:effectLst/>
-                <a:uLnTx/>
-                <a:uFillTx/>
-                <a:latin typeface="Calibri"/>
-                <a:ea typeface="+mn-ea"/>
-                <a:cs typeface="+mn-cs"/>
-              </a:rPr>
-              <a:t>The faces will only be shown briefly. Then you will press a button indicating whether the person was </a:t>
-            </a:r>
-            <a:r>
-              <a:rPr kumimoji="0" lang="en-US" sz="3200" b="0" i="0" u="none" strike="noStrike" kern="1200" cap="none" spc="0" normalizeH="0" baseline="0" noProof="0" dirty="0">
-                <a:ln>
-                  <a:noFill/>
-                </a:ln>
+              <a:rPr lang="en-US" dirty="0"/>
+              <a:t>Your job in the task is to indicate whether the face you see is </a:t>
+            </a:r>
+            <a:r>
+              <a:rPr lang="en-US" dirty="0">
                 <a:solidFill>
                   <a:srgbClr val="FF0000"/>
                 </a:solidFill>
-                <a:effectLst/>
-                <a:uLnTx/>
-                <a:uFillTx/>
-                <a:latin typeface="Calibri"/>
-                <a:ea typeface="+mn-ea"/>
-                <a:cs typeface="+mn-cs"/>
               </a:rPr>
               <a:t>angry</a:t>
             </a:r>
             <a:r>
-              <a:rPr kumimoji="0" lang="en-US" sz="3200" b="0" i="0" u="none" strike="noStrike" kern="1200" cap="none" spc="0" normalizeH="0" baseline="0" noProof="0" dirty="0">
-                <a:ln>
-                  <a:noFill/>
-                </a:ln>
-                <a:solidFill>
-                  <a:prstClr val="white"/>
-                </a:solidFill>
-                <a:effectLst/>
-                <a:uLnTx/>
-                <a:uFillTx/>
-                <a:latin typeface="Calibri"/>
-                <a:ea typeface="+mn-ea"/>
-                <a:cs typeface="+mn-cs"/>
-              </a:rPr>
+              <a:rPr lang="en-US" dirty="0"/>
               <a:t> or </a:t>
             </a:r>
             <a:r>
-              <a:rPr kumimoji="0" lang="en-US" sz="3200" b="0" i="0" u="none" strike="noStrike" kern="1200" cap="none" spc="0" normalizeH="0" baseline="0" noProof="0" dirty="0">
-                <a:ln>
-                  <a:noFill/>
-                </a:ln>
+              <a:rPr lang="en-US" dirty="0">
                 <a:solidFill>
                   <a:schemeClr val="bg2">
                     <a:lumMod val="40000"/>
                     <a:lumOff val="60000"/>
                   </a:schemeClr>
                 </a:solidFill>
-                <a:effectLst/>
-                <a:uLnTx/>
-                <a:uFillTx/>
-                <a:latin typeface="Calibri"/>
-                <a:ea typeface="+mn-ea"/>
-                <a:cs typeface="+mn-cs"/>
               </a:rPr>
               <a:t>sad</a:t>
             </a:r>
             <a:r>
-              <a:rPr kumimoji="0" lang="en-US" sz="3200" b="0" i="0" u="none" strike="noStrike" kern="1200" cap="none" spc="0" normalizeH="0" baseline="0" noProof="0" dirty="0">
-                <a:ln>
-                  <a:noFill/>
-                </a:ln>
-                <a:solidFill>
-                  <a:prstClr val="white"/>
-                </a:solidFill>
-                <a:effectLst/>
-                <a:uLnTx/>
-                <a:uFillTx/>
-                <a:latin typeface="Calibri"/>
-                <a:ea typeface="+mn-ea"/>
-                <a:cs typeface="+mn-cs"/>
-              </a:rPr>
-              <a:t>.</a:t>
-            </a:r>
-          </a:p>
-          <a:p>
-            <a:pPr marL="0" marR="0" lvl="0" indent="0" algn="l" defTabSz="914400" rtl="0" eaLnBrk="1" fontAlgn="auto" latinLnBrk="0" hangingPunct="1">
-              <a:lnSpc>
-                <a:spcPct val="100000"/>
-              </a:lnSpc>
-              <a:spcBef>
-                <a:spcPct val="20000"/>
-              </a:spcBef>
-              <a:spcAft>
-                <a:spcPts val="0"/>
-              </a:spcAft>
-              <a:buClrTx/>
-              <a:buSzTx/>
-              <a:buFont typeface="Arial" pitchFamily="34" charset="0"/>
-              <a:buNone/>
-              <a:tabLst/>
-              <a:defRPr/>
-            </a:pPr>
-            <a:endParaRPr kumimoji="0" lang="en-US" sz="3200" b="0" i="0" u="none" strike="noStrike" kern="1200" cap="none" spc="0" normalizeH="0" baseline="0" noProof="0" dirty="0">
-              <a:ln>
-                <a:noFill/>
-              </a:ln>
-              <a:solidFill>
-                <a:prstClr val="white"/>
-              </a:solidFill>
-              <a:effectLst/>
-              <a:uLnTx/>
-              <a:uFillTx/>
-              <a:latin typeface="Calibri"/>
-              <a:ea typeface="+mn-ea"/>
-              <a:cs typeface="+mn-cs"/>
-            </a:endParaRPr>
-          </a:p>
-          <a:p>
-            <a:pPr marL="0" marR="0" lvl="0" indent="0" algn="l" defTabSz="914400" rtl="0" eaLnBrk="1" fontAlgn="auto" latinLnBrk="0" hangingPunct="1">
-              <a:lnSpc>
-                <a:spcPct val="100000"/>
-              </a:lnSpc>
-              <a:spcBef>
-                <a:spcPct val="20000"/>
-              </a:spcBef>
-              <a:spcAft>
-                <a:spcPts val="0"/>
-              </a:spcAft>
-              <a:buClrTx/>
-              <a:buSzTx/>
-              <a:buFont typeface="Arial" pitchFamily="34" charset="0"/>
-              <a:buNone/>
-              <a:tabLst/>
-              <a:defRPr/>
-            </a:pPr>
-            <a:r>
-              <a:rPr kumimoji="0" lang="en-US" sz="3200" b="0" i="0" u="none" strike="noStrike" kern="1200" cap="none" spc="0" normalizeH="0" baseline="0" noProof="0" dirty="0">
-                <a:ln>
-                  <a:noFill/>
-                </a:ln>
-                <a:solidFill>
-                  <a:prstClr val="white"/>
-                </a:solidFill>
-                <a:effectLst/>
-                <a:uLnTx/>
-                <a:uFillTx/>
-                <a:latin typeface="Calibri"/>
-                <a:ea typeface="+mn-ea"/>
-                <a:cs typeface="+mn-cs"/>
-              </a:rPr>
-              <a:t>Your job is to be </a:t>
-            </a:r>
-            <a:r>
-              <a:rPr kumimoji="0" lang="en-US" sz="3200" b="0" i="0" u="sng" strike="noStrike" kern="1200" cap="none" spc="0" normalizeH="0" baseline="0" noProof="0" dirty="0">
-                <a:ln>
-                  <a:noFill/>
-                </a:ln>
-                <a:solidFill>
-                  <a:prstClr val="white"/>
-                </a:solidFill>
-                <a:effectLst/>
-                <a:uLnTx/>
-                <a:uFillTx/>
-                <a:latin typeface="Calibri"/>
-                <a:ea typeface="+mn-ea"/>
-                <a:cs typeface="+mn-cs"/>
-              </a:rPr>
-              <a:t>as fast and accurate as possible</a:t>
-            </a:r>
-            <a:r>
-              <a:rPr lang="en-US" dirty="0">
-                <a:solidFill>
-                  <a:prstClr val="white"/>
-                </a:solidFill>
-                <a:latin typeface="Calibri"/>
-              </a:rPr>
-              <a:t>.</a:t>
-            </a:r>
-            <a:r>
-              <a:rPr kumimoji="0" lang="en-US" sz="3200" b="0" i="0" u="none" strike="noStrike" kern="1200" cap="none" spc="0" normalizeH="0" baseline="0" noProof="0" dirty="0">
-                <a:ln>
-                  <a:noFill/>
-                </a:ln>
-                <a:solidFill>
-                  <a:prstClr val="white"/>
-                </a:solidFill>
-                <a:effectLst/>
-                <a:uLnTx/>
-                <a:uFillTx/>
-                <a:latin typeface="Calibri"/>
-                <a:ea typeface="+mn-ea"/>
-                <a:cs typeface="+mn-cs"/>
-              </a:rPr>
-              <a:t> Please try your best to respond on every trial. If you take too long to respond, it will be considered incorrect</a:t>
-            </a:r>
-            <a:r>
-              <a:rPr lang="en-US" dirty="0">
-                <a:solidFill>
-                  <a:prstClr val="white"/>
-                </a:solidFill>
-                <a:latin typeface="Calibri"/>
-              </a:rPr>
-              <a:t>. Y</a:t>
-            </a:r>
-            <a:r>
-              <a:rPr kumimoji="0" lang="en-US" sz="3200" b="0" i="0" u="none" strike="noStrike" kern="1200" cap="none" spc="0" normalizeH="0" baseline="0" noProof="0" dirty="0" err="1">
-                <a:ln>
-                  <a:noFill/>
-                </a:ln>
-                <a:solidFill>
-                  <a:prstClr val="white"/>
-                </a:solidFill>
-                <a:effectLst/>
-                <a:uLnTx/>
-                <a:uFillTx/>
-                <a:latin typeface="Calibri"/>
-                <a:ea typeface="+mn-ea"/>
-                <a:cs typeface="+mn-cs"/>
-              </a:rPr>
-              <a:t>ou</a:t>
-            </a:r>
-            <a:r>
-              <a:rPr kumimoji="0" lang="en-US" sz="3200" b="0" i="0" u="none" strike="noStrike" kern="1200" cap="none" spc="0" normalizeH="0" baseline="0" noProof="0" dirty="0">
-                <a:ln>
-                  <a:noFill/>
-                </a:ln>
-                <a:solidFill>
-                  <a:prstClr val="white"/>
-                </a:solidFill>
-                <a:effectLst/>
-                <a:uLnTx/>
-                <a:uFillTx/>
-                <a:latin typeface="Calibri"/>
-                <a:ea typeface="+mn-ea"/>
-                <a:cs typeface="+mn-cs"/>
-              </a:rPr>
-              <a:t> will be told if it was too slow.</a:t>
-            </a:r>
-          </a:p>
-          <a:p>
-            <a:pPr marL="0" marR="0" lvl="0" indent="0" algn="l" defTabSz="914400" rtl="0" eaLnBrk="1" fontAlgn="auto" latinLnBrk="0" hangingPunct="1">
-              <a:lnSpc>
-                <a:spcPct val="100000"/>
-              </a:lnSpc>
-              <a:spcBef>
-                <a:spcPct val="20000"/>
-              </a:spcBef>
-              <a:spcAft>
-                <a:spcPts val="0"/>
-              </a:spcAft>
-              <a:buClrTx/>
-              <a:buSzTx/>
-              <a:buFont typeface="Arial" pitchFamily="34" charset="0"/>
-              <a:buNone/>
-              <a:tabLst/>
-              <a:defRPr/>
-            </a:pPr>
-            <a:endParaRPr kumimoji="0" lang="en-US" sz="3200" b="0" i="0" u="none" strike="noStrike" kern="1200" cap="none" spc="0" normalizeH="0" baseline="0" noProof="0" dirty="0">
-              <a:ln>
-                <a:noFill/>
-              </a:ln>
-              <a:solidFill>
-                <a:prstClr val="white"/>
-              </a:solidFill>
-              <a:effectLst/>
-              <a:uLnTx/>
-              <a:uFillTx/>
-              <a:latin typeface="Calibri"/>
-              <a:ea typeface="+mn-ea"/>
-              <a:cs typeface="+mn-cs"/>
-            </a:endParaRPr>
+              <a:rPr lang="en-US" dirty="0"/>
+              <a:t>. </a:t>
+            </a:r>
           </a:p>
         </p:txBody>
       </p:sp>
@@ -6134,10 +6462,149 @@
           </a:p>
         </p:txBody>
       </p:sp>
+      <p:pic>
+        <p:nvPicPr>
+          <p:cNvPr id="14" name="Picture 13" descr="A picture containing text, person, posing&#10;&#10;Description automatically generated">
+            <a:extLst>
+              <a:ext uri="{FF2B5EF4-FFF2-40B4-BE49-F238E27FC236}">
+                <a16:creationId xmlns:a16="http://schemas.microsoft.com/office/drawing/2014/main" id="{0A01FB74-A9DA-EE46-868B-B8A8CD0882D1}"/>
+              </a:ext>
+            </a:extLst>
+          </p:cNvPr>
+          <p:cNvPicPr>
+            <a:picLocks noChangeAspect="1"/>
+          </p:cNvPicPr>
+          <p:nvPr/>
+        </p:nvPicPr>
+        <p:blipFill>
+          <a:blip r:embed="rId3"/>
+          <a:stretch>
+            <a:fillRect/>
+          </a:stretch>
+        </p:blipFill>
+        <p:spPr>
+          <a:xfrm>
+            <a:off x="6410929" y="2993969"/>
+            <a:ext cx="1437409" cy="1845667"/>
+          </a:xfrm>
+          <a:prstGeom prst="rect">
+            <a:avLst/>
+          </a:prstGeom>
+        </p:spPr>
+      </p:pic>
+      <p:pic>
+        <p:nvPicPr>
+          <p:cNvPr id="15" name="Picture 14" descr="A picture containing text, wall, person, person&#10;&#10;Description automatically generated">
+            <a:extLst>
+              <a:ext uri="{FF2B5EF4-FFF2-40B4-BE49-F238E27FC236}">
+                <a16:creationId xmlns:a16="http://schemas.microsoft.com/office/drawing/2014/main" id="{8BDE757C-E511-FC4F-B752-78F61A15E57D}"/>
+              </a:ext>
+            </a:extLst>
+          </p:cNvPr>
+          <p:cNvPicPr>
+            <a:picLocks noChangeAspect="1"/>
+          </p:cNvPicPr>
+          <p:nvPr/>
+        </p:nvPicPr>
+        <p:blipFill>
+          <a:blip r:embed="rId4"/>
+          <a:stretch>
+            <a:fillRect/>
+          </a:stretch>
+        </p:blipFill>
+        <p:spPr>
+          <a:xfrm>
+            <a:off x="3736649" y="2993969"/>
+            <a:ext cx="1437409" cy="1845667"/>
+          </a:xfrm>
+          <a:prstGeom prst="rect">
+            <a:avLst/>
+          </a:prstGeom>
+        </p:spPr>
+      </p:pic>
+      <p:sp>
+        <p:nvSpPr>
+          <p:cNvPr id="2" name="Rectangle 1">
+            <a:extLst>
+              <a:ext uri="{FF2B5EF4-FFF2-40B4-BE49-F238E27FC236}">
+                <a16:creationId xmlns:a16="http://schemas.microsoft.com/office/drawing/2014/main" id="{D0CDAB50-3409-E849-93AE-7BEDCD560C5F}"/>
+              </a:ext>
+            </a:extLst>
+          </p:cNvPr>
+          <p:cNvSpPr/>
+          <p:nvPr/>
+        </p:nvSpPr>
+        <p:spPr>
+          <a:xfrm>
+            <a:off x="3918099" y="4943668"/>
+            <a:ext cx="1074508" cy="461665"/>
+          </a:xfrm>
+          <a:prstGeom prst="rect">
+            <a:avLst/>
+          </a:prstGeom>
+        </p:spPr>
+        <p:txBody>
+          <a:bodyPr wrap="square">
+            <a:spAutoFit/>
+          </a:bodyPr>
+          <a:lstStyle/>
+          <a:p>
+            <a:pPr algn="ctr"/>
+            <a:r>
+              <a:rPr lang="en-US" sz="2400" dirty="0">
+                <a:solidFill>
+                  <a:srgbClr val="FF0000"/>
+                </a:solidFill>
+              </a:rPr>
+              <a:t>angry</a:t>
+            </a:r>
+            <a:endParaRPr lang="en-US" sz="2400" dirty="0"/>
+          </a:p>
+        </p:txBody>
+      </p:sp>
+      <p:sp>
+        <p:nvSpPr>
+          <p:cNvPr id="20" name="Rectangle 19">
+            <a:extLst>
+              <a:ext uri="{FF2B5EF4-FFF2-40B4-BE49-F238E27FC236}">
+                <a16:creationId xmlns:a16="http://schemas.microsoft.com/office/drawing/2014/main" id="{C5BCB3D3-45D7-EE40-BB61-99D62B22D47D}"/>
+              </a:ext>
+            </a:extLst>
+          </p:cNvPr>
+          <p:cNvSpPr/>
+          <p:nvPr/>
+        </p:nvSpPr>
+        <p:spPr>
+          <a:xfrm>
+            <a:off x="6598307" y="4943669"/>
+            <a:ext cx="1074508" cy="461665"/>
+          </a:xfrm>
+          <a:prstGeom prst="rect">
+            <a:avLst/>
+          </a:prstGeom>
+        </p:spPr>
+        <p:txBody>
+          <a:bodyPr wrap="square">
+            <a:spAutoFit/>
+          </a:bodyPr>
+          <a:lstStyle/>
+          <a:p>
+            <a:pPr algn="ctr"/>
+            <a:r>
+              <a:rPr lang="en-US" sz="2400" dirty="0">
+                <a:solidFill>
+                  <a:srgbClr val="1D6BA9"/>
+                </a:solidFill>
+              </a:rPr>
+              <a:t>sad</a:t>
+            </a:r>
+          </a:p>
+        </p:txBody>
+      </p:sp>
     </p:spTree>
     <p:extLst>
       <p:ext uri="{BB962C8B-B14F-4D97-AF65-F5344CB8AC3E}">
-        <p14:creationId xmlns:p14="http://schemas.microsoft.com/office/powerpoint/2010/main" val="3403851715"/>
+        <p14:creationId xmlns:p14="http://schemas.microsoft.com/office/powerpoint/2010/main" val="1971608208"/>
       </p:ext>
     </p:extLst>
   </p:cSld>
@@ -6236,8 +6703,8 @@
         </p:nvSpPr>
         <p:spPr>
           <a:xfrm>
-            <a:off x="840890" y="2228369"/>
-            <a:ext cx="10510220" cy="3537729"/>
+            <a:off x="840890" y="650531"/>
+            <a:ext cx="10510220" cy="5115568"/>
           </a:xfrm>
         </p:spPr>
         <p:txBody>
@@ -6278,7 +6745,338 @@
                 <a:ea typeface="+mn-ea"/>
                 <a:cs typeface="+mn-cs"/>
               </a:rPr>
-              <a:t>You will also hear one of two tones right before you see each face. One of the tones will have a higher pitch than the other.</a:t>
+              <a:t>The faces will only be shown briefly. Then you will press a button indicating whether the person was </a:t>
+            </a:r>
+            <a:r>
+              <a:rPr kumimoji="0" lang="en-US" sz="3200" b="0" i="0" u="none" strike="noStrike" kern="1200" cap="none" spc="0" normalizeH="0" baseline="0" noProof="0" dirty="0">
+                <a:ln>
+                  <a:noFill/>
+                </a:ln>
+                <a:solidFill>
+                  <a:srgbClr val="FF0000"/>
+                </a:solidFill>
+                <a:effectLst/>
+                <a:uLnTx/>
+                <a:uFillTx/>
+                <a:latin typeface="Calibri"/>
+                <a:ea typeface="+mn-ea"/>
+                <a:cs typeface="+mn-cs"/>
+              </a:rPr>
+              <a:t>angry</a:t>
+            </a:r>
+            <a:r>
+              <a:rPr kumimoji="0" lang="en-US" sz="3200" b="0" i="0" u="none" strike="noStrike" kern="1200" cap="none" spc="0" normalizeH="0" baseline="0" noProof="0" dirty="0">
+                <a:ln>
+                  <a:noFill/>
+                </a:ln>
+                <a:solidFill>
+                  <a:prstClr val="white"/>
+                </a:solidFill>
+                <a:effectLst/>
+                <a:uLnTx/>
+                <a:uFillTx/>
+                <a:latin typeface="Calibri"/>
+                <a:ea typeface="+mn-ea"/>
+                <a:cs typeface="+mn-cs"/>
+              </a:rPr>
+              <a:t> or </a:t>
+            </a:r>
+            <a:r>
+              <a:rPr kumimoji="0" lang="en-US" sz="3200" b="0" i="0" u="none" strike="noStrike" kern="1200" cap="none" spc="0" normalizeH="0" baseline="0" noProof="0" dirty="0">
+                <a:ln>
+                  <a:noFill/>
+                </a:ln>
+                <a:solidFill>
+                  <a:schemeClr val="bg2">
+                    <a:lumMod val="40000"/>
+                    <a:lumOff val="60000"/>
+                  </a:schemeClr>
+                </a:solidFill>
+                <a:effectLst/>
+                <a:uLnTx/>
+                <a:uFillTx/>
+                <a:latin typeface="Calibri"/>
+                <a:ea typeface="+mn-ea"/>
+                <a:cs typeface="+mn-cs"/>
+              </a:rPr>
+              <a:t>sad</a:t>
+            </a:r>
+            <a:r>
+              <a:rPr kumimoji="0" lang="en-US" sz="3200" b="0" i="0" u="none" strike="noStrike" kern="1200" cap="none" spc="0" normalizeH="0" baseline="0" noProof="0" dirty="0">
+                <a:ln>
+                  <a:noFill/>
+                </a:ln>
+                <a:solidFill>
+                  <a:prstClr val="white"/>
+                </a:solidFill>
+                <a:effectLst/>
+                <a:uLnTx/>
+                <a:uFillTx/>
+                <a:latin typeface="Calibri"/>
+                <a:ea typeface="+mn-ea"/>
+                <a:cs typeface="+mn-cs"/>
+              </a:rPr>
+              <a:t>.</a:t>
+            </a:r>
+          </a:p>
+          <a:p>
+            <a:pPr marL="0" marR="0" lvl="0" indent="0" algn="l" defTabSz="914400" rtl="0" eaLnBrk="1" fontAlgn="auto" latinLnBrk="0" hangingPunct="1">
+              <a:lnSpc>
+                <a:spcPct val="100000"/>
+              </a:lnSpc>
+              <a:spcBef>
+                <a:spcPct val="20000"/>
+              </a:spcBef>
+              <a:spcAft>
+                <a:spcPts val="0"/>
+              </a:spcAft>
+              <a:buClrTx/>
+              <a:buSzTx/>
+              <a:buFont typeface="Arial" pitchFamily="34" charset="0"/>
+              <a:buNone/>
+              <a:tabLst/>
+              <a:defRPr/>
+            </a:pPr>
+            <a:endParaRPr kumimoji="0" lang="en-US" sz="3200" b="0" i="0" u="none" strike="noStrike" kern="1200" cap="none" spc="0" normalizeH="0" baseline="0" noProof="0" dirty="0">
+              <a:ln>
+                <a:noFill/>
+              </a:ln>
+              <a:solidFill>
+                <a:prstClr val="white"/>
+              </a:solidFill>
+              <a:effectLst/>
+              <a:uLnTx/>
+              <a:uFillTx/>
+              <a:latin typeface="Calibri"/>
+              <a:ea typeface="+mn-ea"/>
+              <a:cs typeface="+mn-cs"/>
+            </a:endParaRPr>
+          </a:p>
+          <a:p>
+            <a:pPr marL="0" marR="0" lvl="0" indent="0" algn="l" defTabSz="914400" rtl="0" eaLnBrk="1" fontAlgn="auto" latinLnBrk="0" hangingPunct="1">
+              <a:lnSpc>
+                <a:spcPct val="100000"/>
+              </a:lnSpc>
+              <a:spcBef>
+                <a:spcPct val="20000"/>
+              </a:spcBef>
+              <a:spcAft>
+                <a:spcPts val="0"/>
+              </a:spcAft>
+              <a:buClrTx/>
+              <a:buSzTx/>
+              <a:buFont typeface="Arial" pitchFamily="34" charset="0"/>
+              <a:buNone/>
+              <a:tabLst/>
+              <a:defRPr/>
+            </a:pPr>
+            <a:r>
+              <a:rPr kumimoji="0" lang="en-US" sz="3200" b="0" i="0" u="none" strike="noStrike" kern="1200" cap="none" spc="0" normalizeH="0" baseline="0" noProof="0" dirty="0">
+                <a:ln>
+                  <a:noFill/>
+                </a:ln>
+                <a:solidFill>
+                  <a:prstClr val="white"/>
+                </a:solidFill>
+                <a:effectLst/>
+                <a:uLnTx/>
+                <a:uFillTx/>
+                <a:latin typeface="Calibri"/>
+                <a:ea typeface="+mn-ea"/>
+                <a:cs typeface="+mn-cs"/>
+              </a:rPr>
+              <a:t>Your job is to be </a:t>
+            </a:r>
+            <a:r>
+              <a:rPr kumimoji="0" lang="en-US" sz="3200" b="0" i="0" u="sng" strike="noStrike" kern="1200" cap="none" spc="0" normalizeH="0" baseline="0" noProof="0" dirty="0">
+                <a:ln>
+                  <a:noFill/>
+                </a:ln>
+                <a:solidFill>
+                  <a:prstClr val="white"/>
+                </a:solidFill>
+                <a:effectLst/>
+                <a:uLnTx/>
+                <a:uFillTx/>
+                <a:latin typeface="Calibri"/>
+                <a:ea typeface="+mn-ea"/>
+                <a:cs typeface="+mn-cs"/>
+              </a:rPr>
+              <a:t>as fast and accurate as possible</a:t>
+            </a:r>
+            <a:r>
+              <a:rPr lang="en-US" dirty="0">
+                <a:solidFill>
+                  <a:prstClr val="white"/>
+                </a:solidFill>
+                <a:latin typeface="Calibri"/>
+              </a:rPr>
+              <a:t>.</a:t>
+            </a:r>
+            <a:r>
+              <a:rPr kumimoji="0" lang="en-US" sz="3200" b="0" i="0" u="none" strike="noStrike" kern="1200" cap="none" spc="0" normalizeH="0" baseline="0" noProof="0" dirty="0">
+                <a:ln>
+                  <a:noFill/>
+                </a:ln>
+                <a:solidFill>
+                  <a:prstClr val="white"/>
+                </a:solidFill>
+                <a:effectLst/>
+                <a:uLnTx/>
+                <a:uFillTx/>
+                <a:latin typeface="Calibri"/>
+                <a:ea typeface="+mn-ea"/>
+                <a:cs typeface="+mn-cs"/>
+              </a:rPr>
+              <a:t> </a:t>
+            </a:r>
+          </a:p>
+          <a:p>
+            <a:pPr marL="0" marR="0" lvl="0" indent="0" algn="l" defTabSz="914400" rtl="0" eaLnBrk="1" fontAlgn="auto" latinLnBrk="0" hangingPunct="1">
+              <a:lnSpc>
+                <a:spcPct val="100000"/>
+              </a:lnSpc>
+              <a:spcBef>
+                <a:spcPct val="20000"/>
+              </a:spcBef>
+              <a:spcAft>
+                <a:spcPts val="0"/>
+              </a:spcAft>
+              <a:buClrTx/>
+              <a:buSzTx/>
+              <a:buFont typeface="Arial" pitchFamily="34" charset="0"/>
+              <a:buNone/>
+              <a:tabLst/>
+              <a:defRPr/>
+            </a:pPr>
+            <a:r>
+              <a:rPr kumimoji="0" lang="en-US" sz="3200" b="0" i="0" u="none" strike="noStrike" kern="1200" cap="none" spc="0" normalizeH="0" baseline="0" noProof="0" dirty="0">
+                <a:ln>
+                  <a:noFill/>
+                </a:ln>
+                <a:solidFill>
+                  <a:prstClr val="white"/>
+                </a:solidFill>
+                <a:effectLst/>
+                <a:uLnTx/>
+                <a:uFillTx/>
+                <a:latin typeface="Calibri"/>
+                <a:ea typeface="+mn-ea"/>
+                <a:cs typeface="+mn-cs"/>
+              </a:rPr>
+              <a:t>Please try your best to respond on every trial. </a:t>
+            </a:r>
+          </a:p>
+          <a:p>
+            <a:pPr marL="0" marR="0" lvl="0" indent="0" algn="l" defTabSz="914400" rtl="0" eaLnBrk="1" fontAlgn="auto" latinLnBrk="0" hangingPunct="1">
+              <a:lnSpc>
+                <a:spcPct val="100000"/>
+              </a:lnSpc>
+              <a:spcBef>
+                <a:spcPct val="20000"/>
+              </a:spcBef>
+              <a:spcAft>
+                <a:spcPts val="0"/>
+              </a:spcAft>
+              <a:buClrTx/>
+              <a:buSzTx/>
+              <a:buFont typeface="Arial" pitchFamily="34" charset="0"/>
+              <a:buNone/>
+              <a:tabLst/>
+              <a:defRPr/>
+            </a:pPr>
+            <a:endParaRPr kumimoji="0" lang="en-US" sz="3200" b="0" i="0" u="none" strike="noStrike" kern="1200" cap="none" spc="0" normalizeH="0" baseline="0" noProof="0" dirty="0">
+              <a:ln>
+                <a:noFill/>
+              </a:ln>
+              <a:solidFill>
+                <a:prstClr val="white"/>
+              </a:solidFill>
+              <a:effectLst/>
+              <a:uLnTx/>
+              <a:uFillTx/>
+              <a:latin typeface="Calibri"/>
+              <a:ea typeface="+mn-ea"/>
+              <a:cs typeface="+mn-cs"/>
+            </a:endParaRPr>
+          </a:p>
+          <a:p>
+            <a:pPr marL="0" marR="0" lvl="0" indent="0" algn="l" defTabSz="914400" rtl="0" eaLnBrk="1" fontAlgn="auto" latinLnBrk="0" hangingPunct="1">
+              <a:lnSpc>
+                <a:spcPct val="100000"/>
+              </a:lnSpc>
+              <a:spcBef>
+                <a:spcPct val="20000"/>
+              </a:spcBef>
+              <a:spcAft>
+                <a:spcPts val="0"/>
+              </a:spcAft>
+              <a:buClrTx/>
+              <a:buSzTx/>
+              <a:buFont typeface="Arial" pitchFamily="34" charset="0"/>
+              <a:buNone/>
+              <a:tabLst/>
+              <a:defRPr/>
+            </a:pPr>
+            <a:r>
+              <a:rPr kumimoji="0" lang="en-US" sz="3200" b="0" i="0" u="none" strike="noStrike" kern="1200" cap="none" spc="0" normalizeH="0" baseline="0" noProof="0" dirty="0">
+                <a:ln>
+                  <a:noFill/>
+                </a:ln>
+                <a:solidFill>
+                  <a:prstClr val="white"/>
+                </a:solidFill>
+                <a:effectLst/>
+                <a:uLnTx/>
+                <a:uFillTx/>
+                <a:latin typeface="Calibri"/>
+                <a:ea typeface="+mn-ea"/>
+                <a:cs typeface="+mn-cs"/>
+              </a:rPr>
+              <a:t>If you take too long to respond, it will be considered incorrect</a:t>
+            </a:r>
+            <a:r>
+              <a:rPr lang="en-US" dirty="0">
+                <a:solidFill>
+                  <a:prstClr val="white"/>
+                </a:solidFill>
+                <a:latin typeface="Calibri"/>
+              </a:rPr>
+              <a:t>. Y</a:t>
+            </a:r>
+            <a:r>
+              <a:rPr kumimoji="0" lang="en-US" sz="3200" b="0" i="0" u="none" strike="noStrike" kern="1200" cap="none" spc="0" normalizeH="0" baseline="0" noProof="0" dirty="0" err="1">
+                <a:ln>
+                  <a:noFill/>
+                </a:ln>
+                <a:solidFill>
+                  <a:prstClr val="white"/>
+                </a:solidFill>
+                <a:effectLst/>
+                <a:uLnTx/>
+                <a:uFillTx/>
+                <a:latin typeface="Calibri"/>
+                <a:ea typeface="+mn-ea"/>
+                <a:cs typeface="+mn-cs"/>
+              </a:rPr>
+              <a:t>ou</a:t>
+            </a:r>
+            <a:r>
+              <a:rPr kumimoji="0" lang="en-US" sz="3200" b="0" i="0" u="none" strike="noStrike" kern="1200" cap="none" spc="0" normalizeH="0" baseline="0" noProof="0" dirty="0">
+                <a:ln>
+                  <a:noFill/>
+                </a:ln>
+                <a:solidFill>
+                  <a:prstClr val="white"/>
+                </a:solidFill>
+                <a:effectLst/>
+                <a:uLnTx/>
+                <a:uFillTx/>
+                <a:latin typeface="Calibri"/>
+                <a:ea typeface="+mn-ea"/>
+                <a:cs typeface="+mn-cs"/>
+              </a:rPr>
+              <a:t> will be told if it was too slow.</a:t>
             </a:r>
           </a:p>
           <a:p>
@@ -6600,7 +7398,7 @@
     </p:spTree>
     <p:extLst>
       <p:ext uri="{BB962C8B-B14F-4D97-AF65-F5344CB8AC3E}">
-        <p14:creationId xmlns:p14="http://schemas.microsoft.com/office/powerpoint/2010/main" val="589961553"/>
+        <p14:creationId xmlns:p14="http://schemas.microsoft.com/office/powerpoint/2010/main" val="3403851715"/>
       </p:ext>
     </p:extLst>
   </p:cSld>
@@ -6682,61 +7480,68 @@
           <a:bodyPr rtlCol="0" anchor="ctr"/>
           <a:lstStyle/>
           <a:p>
-            <a:pPr marL="0" marR="0" lvl="0" indent="0" algn="ctr" defTabSz="457200" rtl="0" eaLnBrk="1" fontAlgn="auto" latinLnBrk="0" hangingPunct="1">
+            <a:pPr algn="ctr"/>
+            <a:endParaRPr lang="en-US"/>
+          </a:p>
+        </p:txBody>
+      </p:sp>
+      <p:sp>
+        <p:nvSpPr>
+          <p:cNvPr id="3" name="Content Placeholder 2"/>
+          <p:cNvSpPr>
+            <a:spLocks noGrp="1"/>
+          </p:cNvSpPr>
+          <p:nvPr>
+            <p:ph idx="1"/>
+          </p:nvPr>
+        </p:nvSpPr>
+        <p:spPr>
+          <a:xfrm>
+            <a:off x="1182445" y="1191306"/>
+            <a:ext cx="9827110" cy="3537729"/>
+          </a:xfrm>
+        </p:spPr>
+        <p:txBody>
+          <a:bodyPr>
+            <a:noAutofit/>
+          </a:bodyPr>
+          <a:lstStyle/>
+          <a:p>
+            <a:pPr marL="0" marR="0" lvl="0" indent="0" algn="l" defTabSz="914400" rtl="0" eaLnBrk="1" fontAlgn="auto" latinLnBrk="0" hangingPunct="1">
               <a:lnSpc>
                 <a:spcPct val="100000"/>
               </a:lnSpc>
               <a:spcBef>
-                <a:spcPts val="0"/>
+                <a:spcPct val="20000"/>
               </a:spcBef>
               <a:spcAft>
                 <a:spcPts val="0"/>
               </a:spcAft>
               <a:buClrTx/>
               <a:buSzTx/>
-              <a:buFontTx/>
+              <a:buFont typeface="Arial" pitchFamily="34" charset="0"/>
               <a:buNone/>
               <a:tabLst/>
               <a:defRPr/>
             </a:pPr>
-            <a:endParaRPr kumimoji="0" lang="en-US" sz="1800" b="0" i="0" u="none" strike="noStrike" kern="1200" cap="none" spc="0" normalizeH="0" baseline="0" noProof="0">
-              <a:ln>
-                <a:noFill/>
-              </a:ln>
-              <a:solidFill>
-                <a:prstClr val="white"/>
-              </a:solidFill>
-              <a:effectLst/>
-              <a:uLnTx/>
-              <a:uFillTx/>
-              <a:latin typeface="Calibri"/>
-              <a:ea typeface="+mn-ea"/>
-              <a:cs typeface="+mn-cs"/>
-            </a:endParaRPr>
-          </a:p>
-        </p:txBody>
-      </p:sp>
-      <p:sp>
-        <p:nvSpPr>
-          <p:cNvPr id="3" name="Content Placeholder 2"/>
-          <p:cNvSpPr>
-            <a:spLocks noGrp="1"/>
-          </p:cNvSpPr>
-          <p:nvPr>
-            <p:ph idx="1"/>
-          </p:nvPr>
-        </p:nvSpPr>
-        <p:spPr>
-          <a:xfrm>
-            <a:off x="840890" y="1577627"/>
-            <a:ext cx="10510220" cy="3537729"/>
-          </a:xfrm>
-        </p:spPr>
-        <p:txBody>
-          <a:bodyPr>
-            <a:noAutofit/>
-          </a:bodyPr>
-          <a:lstStyle/>
+            <a:r>
+              <a:rPr kumimoji="0" lang="en-US" sz="3200" b="0" i="0" u="none" strike="noStrike" kern="1200" cap="none" spc="0" normalizeH="0" baseline="0" noProof="0" dirty="0">
+                <a:ln>
+                  <a:noFill/>
+                </a:ln>
+                <a:solidFill>
+                  <a:prstClr val="white"/>
+                </a:solidFill>
+                <a:effectLst/>
+                <a:uLnTx/>
+                <a:uFillTx/>
+                <a:latin typeface="Calibri"/>
+                <a:ea typeface="+mn-ea"/>
+                <a:cs typeface="+mn-cs"/>
+              </a:rPr>
+              <a:t>You will also hear one of two tones right before you see each face. </a:t>
+            </a:r>
+          </a:p>
           <a:p>
             <a:pPr marL="0" marR="0" lvl="0" indent="0" algn="l" defTabSz="914400" rtl="0" eaLnBrk="1" fontAlgn="auto" latinLnBrk="0" hangingPunct="1">
               <a:lnSpc>
@@ -6770,68 +7575,7 @@
                 <a:ea typeface="+mn-ea"/>
                 <a:cs typeface="+mn-cs"/>
               </a:rPr>
-              <a:t>Sometimes the pictures of the faces will be easy to see and show strong emotional expressions.</a:t>
-            </a:r>
-          </a:p>
-          <a:p>
-            <a:pPr marL="0" marR="0" lvl="0" indent="0" algn="l" defTabSz="914400" rtl="0" eaLnBrk="1" fontAlgn="auto" latinLnBrk="0" hangingPunct="1">
-              <a:lnSpc>
-                <a:spcPct val="100000"/>
-              </a:lnSpc>
-              <a:spcBef>
-                <a:spcPct val="20000"/>
-              </a:spcBef>
-              <a:spcAft>
-                <a:spcPts val="0"/>
-              </a:spcAft>
-              <a:buClrTx/>
-              <a:buSzTx/>
-              <a:buFont typeface="Arial" pitchFamily="34" charset="0"/>
-              <a:buNone/>
-              <a:tabLst/>
-              <a:defRPr/>
-            </a:pPr>
-            <a:endParaRPr lang="en-US" dirty="0">
-              <a:solidFill>
-                <a:prstClr val="white"/>
-              </a:solidFill>
-              <a:latin typeface="Calibri"/>
-            </a:endParaRPr>
-          </a:p>
-          <a:p>
-            <a:pPr marL="0" marR="0" lvl="0" indent="0" algn="l" defTabSz="914400" rtl="0" eaLnBrk="1" fontAlgn="auto" latinLnBrk="0" hangingPunct="1">
-              <a:lnSpc>
-                <a:spcPct val="100000"/>
-              </a:lnSpc>
-              <a:spcBef>
-                <a:spcPct val="20000"/>
-              </a:spcBef>
-              <a:spcAft>
-                <a:spcPts val="0"/>
-              </a:spcAft>
-              <a:buClrTx/>
-              <a:buSzTx/>
-              <a:buFont typeface="Arial" pitchFamily="34" charset="0"/>
-              <a:buNone/>
-              <a:tabLst/>
-              <a:defRPr/>
-            </a:pPr>
-            <a:r>
-              <a:rPr kumimoji="0" lang="en-US" sz="3200" b="0" i="0" u="none" strike="noStrike" kern="1200" cap="none" spc="0" normalizeH="0" baseline="0" noProof="0" dirty="0">
-                <a:ln>
-                  <a:noFill/>
-                </a:ln>
-                <a:solidFill>
-                  <a:prstClr val="white"/>
-                </a:solidFill>
-                <a:effectLst/>
-                <a:uLnTx/>
-                <a:uFillTx/>
-                <a:latin typeface="Calibri"/>
-                <a:ea typeface="+mn-ea"/>
-                <a:cs typeface="+mn-cs"/>
-              </a:rPr>
-              <a:t>Other times the pictures may be less clear and show less intense emotional expressions.</a:t>
+              <a:t>One of the tones will have a higher pitch than the other.</a:t>
             </a:r>
           </a:p>
           <a:p>
@@ -6907,37 +7651,11 @@
             </a:lvl1pPr>
           </a:lstStyle>
           <a:p>
-            <a:pPr marL="0" marR="0" lvl="0" indent="0" algn="ctr" defTabSz="914400" rtl="0" eaLnBrk="1" fontAlgn="auto" latinLnBrk="0" hangingPunct="1">
-              <a:lnSpc>
-                <a:spcPct val="100000"/>
-              </a:lnSpc>
-              <a:spcBef>
-                <a:spcPct val="0"/>
-              </a:spcBef>
-              <a:spcAft>
-                <a:spcPts val="0"/>
-              </a:spcAft>
-              <a:buClrTx/>
-              <a:buSzTx/>
-              <a:buFontTx/>
-              <a:buNone/>
-              <a:tabLst/>
-              <a:defRPr/>
-            </a:pPr>
-            <a:r>
-              <a:rPr kumimoji="0" lang="en-US" sz="3000" b="0" i="0" u="none" strike="noStrike" kern="1200" cap="none" spc="0" normalizeH="0" baseline="0" noProof="0" dirty="0">
-                <a:ln>
-                  <a:noFill/>
-                </a:ln>
+            <a:r>
+              <a:rPr lang="en-US" sz="3000" dirty="0">
                 <a:solidFill>
                   <a:srgbClr val="FF0000"/>
                 </a:solidFill>
-                <a:effectLst/>
-                <a:uLnTx/>
-                <a:uFillTx/>
-                <a:latin typeface="Calibri"/>
-                <a:ea typeface="+mj-ea"/>
-                <a:cs typeface="+mj-cs"/>
               </a:rPr>
               <a:t>PRESS THE RIGHT BUTTON TO CONTINUE</a:t>
             </a:r>
@@ -7121,37 +7839,11 @@
             </a:lvl9pPr>
           </a:lstStyle>
           <a:p>
-            <a:pPr marL="0" marR="0" lvl="0" indent="0" algn="ctr" defTabSz="914400" rtl="0" eaLnBrk="1" fontAlgn="auto" latinLnBrk="0" hangingPunct="1">
-              <a:lnSpc>
-                <a:spcPct val="100000"/>
-              </a:lnSpc>
-              <a:spcBef>
-                <a:spcPct val="20000"/>
-              </a:spcBef>
-              <a:spcAft>
-                <a:spcPts val="0"/>
-              </a:spcAft>
-              <a:buClrTx/>
-              <a:buSzTx/>
-              <a:buFont typeface="Arial" pitchFamily="34" charset="0"/>
-              <a:buNone/>
-              <a:tabLst/>
-              <a:defRPr/>
-            </a:pPr>
-            <a:r>
-              <a:rPr kumimoji="0" lang="en-US" sz="1600" b="0" i="0" u="none" strike="noStrike" kern="1200" cap="none" spc="0" normalizeH="0" baseline="0" noProof="0" dirty="0">
-                <a:ln>
-                  <a:noFill/>
-                </a:ln>
-                <a:solidFill>
-                  <a:prstClr val="white"/>
-                </a:solidFill>
-                <a:effectLst/>
-                <a:uLnTx/>
-                <a:uFillTx/>
-                <a:latin typeface="Calibri"/>
-                <a:ea typeface="+mn-ea"/>
-                <a:cs typeface="+mn-cs"/>
+            <a:r>
+              <a:rPr lang="en-US" sz="1600" dirty="0">
+                <a:solidFill>
+                  <a:schemeClr val="tx1"/>
+                </a:solidFill>
               </a:rPr>
               <a:t>RIGHT</a:t>
             </a:r>
@@ -7197,44 +7889,15 @@
           <a:bodyPr rtlCol="0" anchor="ctr"/>
           <a:lstStyle/>
           <a:p>
-            <a:pPr marL="0" marR="0" lvl="0" indent="0" algn="ctr" defTabSz="457200" rtl="0" eaLnBrk="1" fontAlgn="auto" latinLnBrk="0" hangingPunct="1">
-              <a:lnSpc>
-                <a:spcPct val="100000"/>
-              </a:lnSpc>
-              <a:spcBef>
-                <a:spcPts val="0"/>
-              </a:spcBef>
-              <a:spcAft>
-                <a:spcPts val="0"/>
-              </a:spcAft>
-              <a:buClrTx/>
-              <a:buSzTx/>
-              <a:buFontTx/>
-              <a:buNone/>
-              <a:tabLst/>
-              <a:defRPr/>
-            </a:pPr>
-            <a:endParaRPr kumimoji="0" lang="en-US" sz="1800" b="0" i="0" u="none" strike="noStrike" kern="1200" cap="none" spc="0" normalizeH="0" baseline="0" noProof="0">
-              <a:ln>
-                <a:noFill/>
-              </a:ln>
-              <a:solidFill>
-                <a:prstClr val="white"/>
-              </a:solidFill>
-              <a:effectLst/>
-              <a:uLnTx/>
-              <a:uFillTx/>
-              <a:latin typeface="Calibri"/>
-              <a:ea typeface="+mn-ea"/>
-              <a:cs typeface="+mn-cs"/>
-            </a:endParaRPr>
+            <a:pPr algn="ctr"/>
+            <a:endParaRPr lang="en-US"/>
           </a:p>
         </p:txBody>
       </p:sp>
     </p:spTree>
     <p:extLst>
       <p:ext uri="{BB962C8B-B14F-4D97-AF65-F5344CB8AC3E}">
-        <p14:creationId xmlns:p14="http://schemas.microsoft.com/office/powerpoint/2010/main" val="1154066736"/>
+        <p14:creationId xmlns:p14="http://schemas.microsoft.com/office/powerpoint/2010/main" val="589961553"/>
       </p:ext>
     </p:extLst>
   </p:cSld>
@@ -7404,15 +8067,59 @@
                 <a:ea typeface="+mn-ea"/>
                 <a:cs typeface="+mn-cs"/>
               </a:rPr>
-              <a:t>To make sure you are familiar with the faces and the emotional expressions, we will now show you each face without a time limit and ask you to indicate whether it is </a:t>
-            </a:r>
+              <a:t>Sometimes the pictures of the faces will be easy to see and show strong emotional expressions.</a:t>
+            </a:r>
+          </a:p>
+          <a:p>
+            <a:pPr marL="0" marR="0" lvl="0" indent="0" algn="l" defTabSz="914400" rtl="0" eaLnBrk="1" fontAlgn="auto" latinLnBrk="0" hangingPunct="1">
+              <a:lnSpc>
+                <a:spcPct val="100000"/>
+              </a:lnSpc>
+              <a:spcBef>
+                <a:spcPct val="20000"/>
+              </a:spcBef>
+              <a:spcAft>
+                <a:spcPts val="0"/>
+              </a:spcAft>
+              <a:buClrTx/>
+              <a:buSzTx/>
+              <a:buFont typeface="Arial" pitchFamily="34" charset="0"/>
+              <a:buNone/>
+              <a:tabLst/>
+              <a:defRPr/>
+            </a:pPr>
+            <a:endParaRPr lang="en-US" dirty="0">
+              <a:solidFill>
+                <a:prstClr val="white"/>
+              </a:solidFill>
+              <a:latin typeface="Calibri"/>
+            </a:endParaRPr>
+          </a:p>
+          <a:p>
+            <a:pPr marL="0" marR="0" lvl="0" indent="0" algn="l" defTabSz="914400" rtl="0" eaLnBrk="1" fontAlgn="auto" latinLnBrk="0" hangingPunct="1">
+              <a:lnSpc>
+                <a:spcPct val="100000"/>
+              </a:lnSpc>
+              <a:spcBef>
+                <a:spcPct val="20000"/>
+              </a:spcBef>
+              <a:spcAft>
+                <a:spcPts val="0"/>
+              </a:spcAft>
+              <a:buClrTx/>
+              <a:buSzTx/>
+              <a:buFont typeface="Arial" pitchFamily="34" charset="0"/>
+              <a:buNone/>
+              <a:tabLst/>
+              <a:defRPr/>
+            </a:pPr>
             <a:r>
               <a:rPr kumimoji="0" lang="en-US" sz="3200" b="0" i="0" u="none" strike="noStrike" kern="1200" cap="none" spc="0" normalizeH="0" baseline="0" noProof="0" dirty="0">
                 <a:ln>
                   <a:noFill/>
                 </a:ln>
                 <a:solidFill>
-                  <a:srgbClr val="FF0000"/>
+                  <a:prstClr val="white"/>
                 </a:solidFill>
                 <a:effectLst/>
                 <a:uLnTx/>
@@ -7421,61 +8128,7 @@
                 <a:ea typeface="+mn-ea"/>
                 <a:cs typeface="+mn-cs"/>
               </a:rPr>
-              <a:t>angry</a:t>
-            </a:r>
-            <a:r>
-              <a:rPr kumimoji="0" lang="en-US" sz="3200" b="0" i="0" u="none" strike="noStrike" kern="1200" cap="none" spc="0" normalizeH="0" baseline="0" noProof="0" dirty="0">
-                <a:ln>
-                  <a:noFill/>
-                </a:ln>
-                <a:solidFill>
-                  <a:prstClr val="white"/>
-                </a:solidFill>
-                <a:effectLst/>
-                <a:uLnTx/>
-                <a:uFillTx/>
-                <a:latin typeface="Calibri"/>
-                <a:ea typeface="+mn-ea"/>
-                <a:cs typeface="+mn-cs"/>
-              </a:rPr>
-              <a:t> or </a:t>
-            </a:r>
-            <a:r>
-              <a:rPr kumimoji="0" lang="en-US" sz="3200" b="0" i="0" u="none" strike="noStrike" kern="1200" cap="none" spc="0" normalizeH="0" baseline="0" noProof="0" dirty="0">
-                <a:ln>
-                  <a:noFill/>
-                </a:ln>
-                <a:solidFill>
-                  <a:schemeClr val="bg2">
-                    <a:lumMod val="40000"/>
-                    <a:lumOff val="60000"/>
-                  </a:schemeClr>
-                </a:solidFill>
-                <a:effectLst/>
-                <a:uLnTx/>
-                <a:uFillTx/>
-                <a:latin typeface="Calibri"/>
-                <a:ea typeface="+mn-ea"/>
-                <a:cs typeface="+mn-cs"/>
-              </a:rPr>
-              <a:t>sad</a:t>
-            </a:r>
-            <a:r>
-              <a:rPr kumimoji="0" lang="en-US" sz="3200" b="0" i="0" u="none" strike="noStrike" kern="1200" cap="none" spc="0" normalizeH="0" baseline="0" noProof="0" dirty="0">
-                <a:ln>
-                  <a:noFill/>
-                </a:ln>
-                <a:solidFill>
-                  <a:prstClr val="white"/>
-                </a:solidFill>
-                <a:effectLst/>
-                <a:uLnTx/>
-                <a:uFillTx/>
-                <a:latin typeface="Calibri"/>
-                <a:ea typeface="+mn-ea"/>
-                <a:cs typeface="+mn-cs"/>
-              </a:rPr>
-              <a:t>. </a:t>
+              <a:t>Other times the pictures may be less clear and show less intense emotional expressions.</a:t>
             </a:r>
           </a:p>
           <a:p>
@@ -7878,7 +8531,7 @@
     </p:spTree>
     <p:extLst>
       <p:ext uri="{BB962C8B-B14F-4D97-AF65-F5344CB8AC3E}">
-        <p14:creationId xmlns:p14="http://schemas.microsoft.com/office/powerpoint/2010/main" val="3569496068"/>
+        <p14:creationId xmlns:p14="http://schemas.microsoft.com/office/powerpoint/2010/main" val="1154066736"/>
       </p:ext>
     </p:extLst>
   </p:cSld>
@@ -8006,8 +8659,8 @@
         </p:nvSpPr>
         <p:spPr>
           <a:xfrm>
-            <a:off x="840890" y="1129553"/>
-            <a:ext cx="10510220" cy="4636546"/>
+            <a:off x="840890" y="1577627"/>
+            <a:ext cx="10510220" cy="3537729"/>
           </a:xfrm>
         </p:spPr>
         <p:txBody>
@@ -8016,7 +8669,7 @@
           </a:bodyPr>
           <a:lstStyle/>
           <a:p>
-            <a:pPr marL="0" marR="0" lvl="0" indent="0" algn="ctr" defTabSz="914400" rtl="0" eaLnBrk="1" fontAlgn="auto" latinLnBrk="0" hangingPunct="1">
+            <a:pPr marL="0" marR="0" lvl="0" indent="0" algn="l" defTabSz="914400" rtl="0" eaLnBrk="1" fontAlgn="auto" latinLnBrk="0" hangingPunct="1">
               <a:lnSpc>
                 <a:spcPct val="100000"/>
               </a:lnSpc>
@@ -8048,7 +8701,7 @@
                 <a:ea typeface="+mn-ea"/>
                 <a:cs typeface="+mn-cs"/>
               </a:rPr>
-              <a:t>To indicate </a:t>
+              <a:t>To make sure you are familiar with the faces and the emotional expressions, we will now show you each face without a time limit and ask you to indicate whether it is </a:t>
             </a:r>
             <a:r>
               <a:rPr kumimoji="0" lang="en-US" sz="3200" b="0" i="0" u="none" strike="noStrike" kern="1200" cap="none" spc="0" normalizeH="0" baseline="0" noProof="0" dirty="0">
@@ -8056,10 +8709,7 @@
                   <a:noFill/>
                 </a:ln>
                 <a:solidFill>
-                  <a:schemeClr val="bg2">
-                    <a:lumMod val="40000"/>
-                    <a:lumOff val="60000"/>
-                  </a:schemeClr>
+                  <a:srgbClr val="FF0000"/>
                 </a:solidFill>
                 <a:effectLst/>
                 <a:uLnTx/>
@@ -8068,7 +8718,7 @@
                 <a:ea typeface="+mn-ea"/>
                 <a:cs typeface="+mn-cs"/>
               </a:rPr>
-              <a:t>sadness</a:t>
+              <a:t>angry</a:t>
             </a:r>
             <a:r>
               <a:rPr kumimoji="0" lang="en-US" sz="3200" b="0" i="0" u="none" strike="noStrike" kern="1200" cap="none" spc="0" normalizeH="0" baseline="0" noProof="0" dirty="0">
@@ -8085,59 +8735,18 @@
                 <a:ea typeface="+mn-ea"/>
                 <a:cs typeface="+mn-cs"/>
               </a:rPr>
-              <a:t>, press the LEFT key.</a:t>
-            </a:r>
-          </a:p>
-          <a:p>
-            <a:pPr marL="0" marR="0" lvl="0" indent="0" algn="ctr" defTabSz="914400" rtl="0" eaLnBrk="1" fontAlgn="auto" latinLnBrk="0" hangingPunct="1">
-              <a:lnSpc>
-                <a:spcPct val="100000"/>
-              </a:lnSpc>
-              <a:spcBef>
-                <a:spcPct val="20000"/>
-              </a:spcBef>
-              <a:spcAft>
-                <a:spcPts val="0"/>
-              </a:spcAft>
-              <a:buClrTx/>
-              <a:buSzTx/>
-              <a:buFont typeface="Arial" pitchFamily="34" charset="0"/>
-              <a:buNone/>
-              <a:tabLst/>
-              <a:defRPr/>
-            </a:pPr>
-            <a:endParaRPr lang="en-US" dirty="0">
-              <a:solidFill>
-                <a:prstClr val="white"/>
-              </a:solidFill>
-              <a:latin typeface="Calibri"/>
-            </a:endParaRPr>
-          </a:p>
-          <a:p>
-            <a:pPr marL="0" marR="0" lvl="0" indent="0" algn="ctr" defTabSz="914400" rtl="0" eaLnBrk="1" fontAlgn="auto" latinLnBrk="0" hangingPunct="1">
-              <a:lnSpc>
-                <a:spcPct val="100000"/>
-              </a:lnSpc>
-              <a:spcBef>
-                <a:spcPct val="20000"/>
-              </a:spcBef>
-              <a:spcAft>
-                <a:spcPts val="0"/>
-              </a:spcAft>
-              <a:buClrTx/>
-              <a:buSzTx/>
-              <a:buFont typeface="Arial" pitchFamily="34" charset="0"/>
-              <a:buNone/>
-              <a:tabLst/>
-              <a:defRPr/>
-            </a:pPr>
+              <a:t> or </a:t>
+            </a:r>
             <a:r>
               <a:rPr kumimoji="0" lang="en-US" sz="3200" b="0" i="0" u="none" strike="noStrike" kern="1200" cap="none" spc="0" normalizeH="0" baseline="0" noProof="0" dirty="0">
                 <a:ln>
                   <a:noFill/>
                 </a:ln>
                 <a:solidFill>
-                  <a:prstClr val="white"/>
+                  <a:schemeClr val="bg2">
+                    <a:lumMod val="40000"/>
+                    <a:lumOff val="60000"/>
+                  </a:schemeClr>
                 </a:solidFill>
                 <a:effectLst/>
                 <a:uLnTx/>
@@ -8146,7 +8755,7 @@
                 <a:ea typeface="+mn-ea"/>
                 <a:cs typeface="+mn-cs"/>
               </a:rPr>
-              <a:t>To indicate </a:t>
+              <a:t>sad</a:t>
             </a:r>
             <a:r>
               <a:rPr kumimoji="0" lang="en-US" sz="3200" b="0" i="0" u="none" strike="noStrike" kern="1200" cap="none" spc="0" normalizeH="0" baseline="0" noProof="0" dirty="0">
@@ -8154,7 +8763,7 @@
                   <a:noFill/>
                 </a:ln>
                 <a:solidFill>
-                  <a:srgbClr val="FF0000"/>
+                  <a:prstClr val="white"/>
                 </a:solidFill>
                 <a:effectLst/>
                 <a:uLnTx/>
@@ -8163,28 +8772,11 @@
                 <a:ea typeface="+mn-ea"/>
                 <a:cs typeface="+mn-cs"/>
               </a:rPr>
-              <a:t>anger</a:t>
-            </a:r>
-            <a:r>
-              <a:rPr kumimoji="0" lang="en-US" sz="3200" b="0" i="0" u="none" strike="noStrike" kern="1200" cap="none" spc="0" normalizeH="0" baseline="0" noProof="0" dirty="0">
-                <a:ln>
-                  <a:noFill/>
-                </a:ln>
-                <a:solidFill>
-                  <a:prstClr val="white"/>
-                </a:solidFill>
-                <a:effectLst/>
-                <a:uLnTx/>
-                <a:uFillTx/>
-                <a:latin typeface="Calibri"/>
-                <a:ea typeface="+mn-ea"/>
-                <a:cs typeface="+mn-cs"/>
-              </a:rPr>
-              <a:t>, press the RIGHT key.</a:t>
-            </a:r>
-          </a:p>
-          <a:p>
-            <a:pPr marL="0" marR="0" lvl="0" indent="0" algn="ctr" defTabSz="914400" rtl="0" eaLnBrk="1" fontAlgn="auto" latinLnBrk="0" hangingPunct="1">
+              <a:t>. </a:t>
+            </a:r>
+          </a:p>
+          <a:p>
+            <a:pPr marL="0" marR="0" lvl="0" indent="0" algn="l" defTabSz="914400" rtl="0" eaLnBrk="1" fontAlgn="auto" latinLnBrk="0" hangingPunct="1">
               <a:lnSpc>
                 <a:spcPct val="100000"/>
               </a:lnSpc>
@@ -8583,7 +9175,7 @@
     </p:spTree>
     <p:extLst>
       <p:ext uri="{BB962C8B-B14F-4D97-AF65-F5344CB8AC3E}">
-        <p14:creationId xmlns:p14="http://schemas.microsoft.com/office/powerpoint/2010/main" val="1335218107"/>
+        <p14:creationId xmlns:p14="http://schemas.microsoft.com/office/powerpoint/2010/main" val="3569496068"/>
       </p:ext>
     </p:extLst>
   </p:cSld>
@@ -8620,6 +9212,311 @@
       </p:grpSpPr>
       <p:sp>
         <p:nvSpPr>
+          <p:cNvPr id="9" name="Rectangle 8">
+            <a:extLst>
+              <a:ext uri="{FF2B5EF4-FFF2-40B4-BE49-F238E27FC236}">
+                <a16:creationId xmlns:a16="http://schemas.microsoft.com/office/drawing/2014/main" id="{9CF7FDCD-4506-AD49-80FB-0B498E8805E9}"/>
+              </a:ext>
+            </a:extLst>
+          </p:cNvPr>
+          <p:cNvSpPr/>
+          <p:nvPr/>
+        </p:nvSpPr>
+        <p:spPr>
+          <a:xfrm>
+            <a:off x="7672815" y="4296719"/>
+            <a:ext cx="351046" cy="276498"/>
+          </a:xfrm>
+          <a:prstGeom prst="rect">
+            <a:avLst/>
+          </a:prstGeom>
+          <a:solidFill>
+            <a:schemeClr val="bg1"/>
+          </a:solidFill>
+          <a:ln>
+            <a:noFill/>
+          </a:ln>
+        </p:spPr>
+        <p:style>
+          <a:lnRef idx="2">
+            <a:schemeClr val="accent1">
+              <a:shade val="50000"/>
+            </a:schemeClr>
+          </a:lnRef>
+          <a:fillRef idx="1">
+            <a:schemeClr val="accent1"/>
+          </a:fillRef>
+          <a:effectRef idx="0">
+            <a:schemeClr val="accent1"/>
+          </a:effectRef>
+          <a:fontRef idx="minor">
+            <a:schemeClr val="lt1"/>
+          </a:fontRef>
+        </p:style>
+        <p:txBody>
+          <a:bodyPr rtlCol="0" anchor="ctr"/>
+          <a:lstStyle/>
+          <a:p>
+            <a:pPr marL="0" marR="0" lvl="0" indent="0" algn="ctr" defTabSz="457200" rtl="0" eaLnBrk="1" fontAlgn="auto" latinLnBrk="0" hangingPunct="1">
+              <a:lnSpc>
+                <a:spcPct val="100000"/>
+              </a:lnSpc>
+              <a:spcBef>
+                <a:spcPts val="0"/>
+              </a:spcBef>
+              <a:spcAft>
+                <a:spcPts val="0"/>
+              </a:spcAft>
+              <a:buClrTx/>
+              <a:buSzTx/>
+              <a:buFontTx/>
+              <a:buNone/>
+              <a:tabLst/>
+              <a:defRPr/>
+            </a:pPr>
+            <a:endParaRPr kumimoji="0" lang="en-US" sz="1800" b="0" i="0" u="none" strike="noStrike" kern="1200" cap="none" spc="0" normalizeH="0" baseline="0" noProof="0">
+              <a:ln>
+                <a:noFill/>
+              </a:ln>
+              <a:solidFill>
+                <a:prstClr val="white"/>
+              </a:solidFill>
+              <a:effectLst/>
+              <a:uLnTx/>
+              <a:uFillTx/>
+              <a:latin typeface="Calibri"/>
+              <a:ea typeface="+mn-ea"/>
+              <a:cs typeface="+mn-cs"/>
+            </a:endParaRPr>
+          </a:p>
+        </p:txBody>
+      </p:sp>
+      <p:sp>
+        <p:nvSpPr>
+          <p:cNvPr id="3" name="Content Placeholder 2"/>
+          <p:cNvSpPr>
+            <a:spLocks noGrp="1"/>
+          </p:cNvSpPr>
+          <p:nvPr>
+            <p:ph idx="1"/>
+          </p:nvPr>
+        </p:nvSpPr>
+        <p:spPr>
+          <a:xfrm>
+            <a:off x="840890" y="1129553"/>
+            <a:ext cx="10510220" cy="4636546"/>
+          </a:xfrm>
+        </p:spPr>
+        <p:txBody>
+          <a:bodyPr>
+            <a:noAutofit/>
+          </a:bodyPr>
+          <a:lstStyle/>
+          <a:p>
+            <a:pPr marL="0" marR="0" lvl="0" indent="0" algn="ctr" defTabSz="914400" rtl="0" eaLnBrk="1" fontAlgn="auto" latinLnBrk="0" hangingPunct="1">
+              <a:lnSpc>
+                <a:spcPct val="100000"/>
+              </a:lnSpc>
+              <a:spcBef>
+                <a:spcPct val="20000"/>
+              </a:spcBef>
+              <a:spcAft>
+                <a:spcPts val="0"/>
+              </a:spcAft>
+              <a:buClrTx/>
+              <a:buSzTx/>
+              <a:buFont typeface="Arial" pitchFamily="34" charset="0"/>
+              <a:buNone/>
+              <a:tabLst/>
+              <a:defRPr/>
+            </a:pPr>
+            <a:r>
+              <a:rPr kumimoji="0" lang="en-US" sz="3200" b="0" i="0" u="none" strike="noStrike" kern="1200" cap="none" spc="0" normalizeH="0" baseline="0" noProof="0" dirty="0">
+                <a:ln>
+                  <a:noFill/>
+                </a:ln>
+                <a:solidFill>
+                  <a:prstClr val="white"/>
+                </a:solidFill>
+                <a:effectLst/>
+                <a:uLnTx/>
+                <a:uFillTx/>
+                <a:latin typeface="Calibri"/>
+                <a:ea typeface="+mn-ea"/>
+                <a:cs typeface="+mn-cs"/>
+              </a:rPr>
+              <a:t>To indicate </a:t>
+            </a:r>
+            <a:r>
+              <a:rPr kumimoji="0" lang="en-US" sz="3200" b="0" i="0" u="none" strike="noStrike" kern="1200" cap="none" spc="0" normalizeH="0" baseline="0" noProof="0" dirty="0">
+                <a:ln>
+                  <a:noFill/>
+                </a:ln>
+                <a:solidFill>
+                  <a:schemeClr val="bg2">
+                    <a:lumMod val="40000"/>
+                    <a:lumOff val="60000"/>
+                  </a:schemeClr>
+                </a:solidFill>
+                <a:effectLst/>
+                <a:uLnTx/>
+                <a:uFillTx/>
+                <a:latin typeface="Calibri"/>
+                <a:ea typeface="+mn-ea"/>
+                <a:cs typeface="+mn-cs"/>
+              </a:rPr>
+              <a:t>sadness</a:t>
+            </a:r>
+            <a:r>
+              <a:rPr kumimoji="0" lang="en-US" sz="3200" b="0" i="0" u="none" strike="noStrike" kern="1200" cap="none" spc="0" normalizeH="0" baseline="0" noProof="0" dirty="0">
+                <a:ln>
+                  <a:noFill/>
+                </a:ln>
+                <a:solidFill>
+                  <a:prstClr val="white"/>
+                </a:solidFill>
+                <a:effectLst/>
+                <a:uLnTx/>
+                <a:uFillTx/>
+                <a:latin typeface="Calibri"/>
+                <a:ea typeface="+mn-ea"/>
+                <a:cs typeface="+mn-cs"/>
+              </a:rPr>
+              <a:t>, press the LEFT key.</a:t>
+            </a:r>
+          </a:p>
+          <a:p>
+            <a:pPr marL="0" marR="0" lvl="0" indent="0" algn="ctr" defTabSz="914400" rtl="0" eaLnBrk="1" fontAlgn="auto" latinLnBrk="0" hangingPunct="1">
+              <a:lnSpc>
+                <a:spcPct val="100000"/>
+              </a:lnSpc>
+              <a:spcBef>
+                <a:spcPct val="20000"/>
+              </a:spcBef>
+              <a:spcAft>
+                <a:spcPts val="0"/>
+              </a:spcAft>
+              <a:buClrTx/>
+              <a:buSzTx/>
+              <a:buFont typeface="Arial" pitchFamily="34" charset="0"/>
+              <a:buNone/>
+              <a:tabLst/>
+              <a:defRPr/>
+            </a:pPr>
+            <a:endParaRPr lang="en-US" dirty="0">
+              <a:solidFill>
+                <a:prstClr val="white"/>
+              </a:solidFill>
+              <a:latin typeface="Calibri"/>
+            </a:endParaRPr>
+          </a:p>
+          <a:p>
+            <a:pPr marL="0" marR="0" lvl="0" indent="0" algn="ctr" defTabSz="914400" rtl="0" eaLnBrk="1" fontAlgn="auto" latinLnBrk="0" hangingPunct="1">
+              <a:lnSpc>
+                <a:spcPct val="100000"/>
+              </a:lnSpc>
+              <a:spcBef>
+                <a:spcPct val="20000"/>
+              </a:spcBef>
+              <a:spcAft>
+                <a:spcPts val="0"/>
+              </a:spcAft>
+              <a:buClrTx/>
+              <a:buSzTx/>
+              <a:buFont typeface="Arial" pitchFamily="34" charset="0"/>
+              <a:buNone/>
+              <a:tabLst/>
+              <a:defRPr/>
+            </a:pPr>
+            <a:r>
+              <a:rPr kumimoji="0" lang="en-US" sz="3200" b="0" i="0" u="none" strike="noStrike" kern="1200" cap="none" spc="0" normalizeH="0" baseline="0" noProof="0" dirty="0">
+                <a:ln>
+                  <a:noFill/>
+                </a:ln>
+                <a:solidFill>
+                  <a:prstClr val="white"/>
+                </a:solidFill>
+                <a:effectLst/>
+                <a:uLnTx/>
+                <a:uFillTx/>
+                <a:latin typeface="Calibri"/>
+                <a:ea typeface="+mn-ea"/>
+                <a:cs typeface="+mn-cs"/>
+              </a:rPr>
+              <a:t>To indicate </a:t>
+            </a:r>
+            <a:r>
+              <a:rPr kumimoji="0" lang="en-US" sz="3200" b="0" i="0" u="none" strike="noStrike" kern="1200" cap="none" spc="0" normalizeH="0" baseline="0" noProof="0" dirty="0">
+                <a:ln>
+                  <a:noFill/>
+                </a:ln>
+                <a:solidFill>
+                  <a:srgbClr val="FF0000"/>
+                </a:solidFill>
+                <a:effectLst/>
+                <a:uLnTx/>
+                <a:uFillTx/>
+                <a:latin typeface="Calibri"/>
+                <a:ea typeface="+mn-ea"/>
+                <a:cs typeface="+mn-cs"/>
+              </a:rPr>
+              <a:t>anger</a:t>
+            </a:r>
+            <a:r>
+              <a:rPr kumimoji="0" lang="en-US" sz="3200" b="0" i="0" u="none" strike="noStrike" kern="1200" cap="none" spc="0" normalizeH="0" baseline="0" noProof="0" dirty="0">
+                <a:ln>
+                  <a:noFill/>
+                </a:ln>
+                <a:solidFill>
+                  <a:prstClr val="white"/>
+                </a:solidFill>
+                <a:effectLst/>
+                <a:uLnTx/>
+                <a:uFillTx/>
+                <a:latin typeface="Calibri"/>
+                <a:ea typeface="+mn-ea"/>
+                <a:cs typeface="+mn-cs"/>
+              </a:rPr>
+              <a:t>, press the RIGHT key.</a:t>
+            </a:r>
+          </a:p>
+          <a:p>
+            <a:pPr marL="0" marR="0" lvl="0" indent="0" algn="ctr" defTabSz="914400" rtl="0" eaLnBrk="1" fontAlgn="auto" latinLnBrk="0" hangingPunct="1">
+              <a:lnSpc>
+                <a:spcPct val="100000"/>
+              </a:lnSpc>
+              <a:spcBef>
+                <a:spcPct val="20000"/>
+              </a:spcBef>
+              <a:spcAft>
+                <a:spcPts val="0"/>
+              </a:spcAft>
+              <a:buClrTx/>
+              <a:buSzTx/>
+              <a:buFont typeface="Arial" pitchFamily="34" charset="0"/>
+              <a:buNone/>
+              <a:tabLst/>
+              <a:defRPr/>
+            </a:pPr>
+            <a:endParaRPr kumimoji="0" lang="en-US" sz="3200" b="0" i="0" u="none" strike="noStrike" kern="1200" cap="none" spc="0" normalizeH="0" baseline="0" noProof="0" dirty="0">
+              <a:ln>
+                <a:noFill/>
+              </a:ln>
+              <a:solidFill>
+                <a:prstClr val="white"/>
+              </a:solidFill>
+              <a:effectLst/>
+              <a:uLnTx/>
+              <a:uFillTx/>
+              <a:latin typeface="Calibri"/>
+              <a:ea typeface="+mn-ea"/>
+              <a:cs typeface="+mn-cs"/>
+            </a:endParaRPr>
+          </a:p>
+        </p:txBody>
+      </p:sp>
+      <p:sp>
+        <p:nvSpPr>
           <p:cNvPr id="26" name="Title 3"/>
           <p:cNvSpPr txBox="1">
             <a:spLocks/>
@@ -8980,88 +9877,10 @@
           </a:p>
         </p:txBody>
       </p:sp>
-      <p:sp>
-        <p:nvSpPr>
-          <p:cNvPr id="15" name="Content Placeholder 2">
-            <a:extLst>
-              <a:ext uri="{FF2B5EF4-FFF2-40B4-BE49-F238E27FC236}">
-                <a16:creationId xmlns:a16="http://schemas.microsoft.com/office/drawing/2014/main" id="{BB089F57-6179-B14E-8148-2009637B51FB}"/>
-              </a:ext>
-            </a:extLst>
-          </p:cNvPr>
-          <p:cNvSpPr>
-            <a:spLocks noGrp="1"/>
-          </p:cNvSpPr>
-          <p:nvPr>
-            <p:ph idx="1"/>
-          </p:nvPr>
-        </p:nvSpPr>
-        <p:spPr>
-          <a:xfrm>
-            <a:off x="2131807" y="1489416"/>
-            <a:ext cx="7928386" cy="1463040"/>
-          </a:xfrm>
-        </p:spPr>
-        <p:txBody>
-          <a:bodyPr>
-            <a:noAutofit/>
-          </a:bodyPr>
-          <a:lstStyle/>
-          <a:p>
-            <a:pPr marL="0" indent="0">
-              <a:buNone/>
-            </a:pPr>
-            <a:r>
-              <a:rPr lang="en-US" dirty="0"/>
-              <a:t>You are now ready to do the task. Remember, try to be </a:t>
-            </a:r>
-            <a:r>
-              <a:rPr lang="en-US" u="sng" dirty="0"/>
-              <a:t>as fast and accurate as possible</a:t>
-            </a:r>
-            <a:r>
-              <a:rPr lang="en-US" dirty="0"/>
-              <a:t>. Also try to </a:t>
-            </a:r>
-            <a:r>
-              <a:rPr lang="en-US" u="sng" dirty="0"/>
-              <a:t>respond on every trial</a:t>
-            </a:r>
-            <a:r>
-              <a:rPr lang="en-US" dirty="0"/>
-              <a:t>.</a:t>
-            </a:r>
-          </a:p>
-          <a:p>
-            <a:pPr marL="0" indent="0">
-              <a:buNone/>
-            </a:pPr>
-            <a:endParaRPr lang="en-US" dirty="0"/>
-          </a:p>
-          <a:p>
-            <a:pPr marL="0" indent="0">
-              <a:buNone/>
-            </a:pPr>
-            <a:r>
-              <a:rPr lang="en-US" dirty="0"/>
-              <a:t>To help you get comfortable with this task,</a:t>
-            </a:r>
-          </a:p>
-          <a:p>
-            <a:pPr marL="0" indent="0">
-              <a:buNone/>
-            </a:pPr>
-            <a:r>
-              <a:rPr lang="en-US" dirty="0"/>
-              <a:t>let’s do a few practice trials first.</a:t>
-            </a:r>
-          </a:p>
-        </p:txBody>
-      </p:sp>
     </p:spTree>
     <p:extLst>
       <p:ext uri="{BB962C8B-B14F-4D97-AF65-F5344CB8AC3E}">
-        <p14:creationId xmlns:p14="http://schemas.microsoft.com/office/powerpoint/2010/main" val="391538907"/>
+        <p14:creationId xmlns:p14="http://schemas.microsoft.com/office/powerpoint/2010/main" val="1335218107"/>
       </p:ext>
     </p:extLst>
   </p:cSld>
@@ -9098,78 +9917,16 @@
       </p:grpSpPr>
       <p:sp>
         <p:nvSpPr>
-          <p:cNvPr id="15" name="Content Placeholder 2">
-            <a:extLst>
-              <a:ext uri="{FF2B5EF4-FFF2-40B4-BE49-F238E27FC236}">
-                <a16:creationId xmlns:a16="http://schemas.microsoft.com/office/drawing/2014/main" id="{BB089F57-6179-B14E-8148-2009637B51FB}"/>
-              </a:ext>
-            </a:extLst>
-          </p:cNvPr>
-          <p:cNvSpPr>
-            <a:spLocks noGrp="1"/>
-          </p:cNvSpPr>
-          <p:nvPr>
-            <p:ph idx="1"/>
-          </p:nvPr>
+          <p:cNvPr id="26" name="Title 3"/>
+          <p:cNvSpPr txBox="1">
+            <a:spLocks/>
+          </p:cNvSpPr>
+          <p:nvPr/>
         </p:nvSpPr>
         <p:spPr>
           <a:xfrm>
-            <a:off x="1264920" y="1065627"/>
-            <a:ext cx="9662159" cy="1804181"/>
-          </a:xfrm>
-        </p:spPr>
-        <p:txBody>
-          <a:bodyPr>
-            <a:noAutofit/>
-          </a:bodyPr>
-          <a:lstStyle/>
-          <a:p>
-            <a:pPr marL="0" indent="0" algn="ctr">
-              <a:buNone/>
-            </a:pPr>
-            <a:r>
-              <a:rPr lang="en-US" dirty="0"/>
-              <a:t>Great Job!</a:t>
-            </a:r>
-          </a:p>
-          <a:p>
-            <a:pPr marL="0" indent="0" algn="ctr">
-              <a:buNone/>
-            </a:pPr>
-            <a:r>
-              <a:rPr lang="en-US" dirty="0"/>
-              <a:t>Let’s begin the real events!</a:t>
-            </a:r>
-          </a:p>
-          <a:p>
-            <a:pPr marL="0" indent="0" algn="ctr">
-              <a:buNone/>
-            </a:pPr>
-            <a:r>
-              <a:rPr lang="en-US" dirty="0"/>
-              <a:t>Good luck!</a:t>
-            </a:r>
-          </a:p>
-        </p:txBody>
-      </p:sp>
-      <p:sp>
-        <p:nvSpPr>
-          <p:cNvPr id="6" name="Title 3">
-            <a:extLst>
-              <a:ext uri="{FF2B5EF4-FFF2-40B4-BE49-F238E27FC236}">
-                <a16:creationId xmlns:a16="http://schemas.microsoft.com/office/drawing/2014/main" id="{BAAE0E0B-4974-DD4C-AAA7-9A9C12314860}"/>
-              </a:ext>
-            </a:extLst>
-          </p:cNvPr>
-          <p:cNvSpPr txBox="1">
-            <a:spLocks/>
-          </p:cNvSpPr>
-          <p:nvPr/>
-        </p:nvSpPr>
-        <p:spPr>
-          <a:xfrm>
-            <a:off x="3031351" y="3644440"/>
-            <a:ext cx="6111932" cy="656705"/>
+            <a:off x="1524000" y="6201295"/>
+            <a:ext cx="9149174" cy="656705"/>
           </a:xfrm>
           <a:prstGeom prst="rect">
             <a:avLst/>
@@ -9196,34 +9953,46 @@
             </a:lvl1pPr>
           </a:lstStyle>
           <a:p>
-            <a:r>
-              <a:rPr lang="en-US" sz="3000" dirty="0">
+            <a:pPr marL="0" marR="0" lvl="0" indent="0" algn="ctr" defTabSz="914400" rtl="0" eaLnBrk="1" fontAlgn="auto" latinLnBrk="0" hangingPunct="1">
+              <a:lnSpc>
+                <a:spcPct val="100000"/>
+              </a:lnSpc>
+              <a:spcBef>
+                <a:spcPct val="0"/>
+              </a:spcBef>
+              <a:spcAft>
+                <a:spcPts val="0"/>
+              </a:spcAft>
+              <a:buClrTx/>
+              <a:buSzTx/>
+              <a:buFontTx/>
+              <a:buNone/>
+              <a:tabLst/>
+              <a:defRPr/>
+            </a:pPr>
+            <a:r>
+              <a:rPr kumimoji="0" lang="en-US" sz="3000" b="0" i="0" u="none" strike="noStrike" kern="1200" cap="none" spc="0" normalizeH="0" baseline="0" noProof="0" dirty="0">
+                <a:ln>
+                  <a:noFill/>
+                </a:ln>
                 <a:solidFill>
                   <a:srgbClr val="FF0000"/>
                 </a:solidFill>
+                <a:effectLst/>
+                <a:uLnTx/>
+                <a:uFillTx/>
+                <a:latin typeface="Calibri"/>
+                <a:ea typeface="+mj-ea"/>
+                <a:cs typeface="+mj-cs"/>
               </a:rPr>
-              <a:t>PRESS THE RIGHT BUTTON TO </a:t>
-            </a:r>
-            <a:r>
-              <a:rPr lang="en-US" sz="3000" u="sng" dirty="0">
-                <a:solidFill>
-                  <a:srgbClr val="FF0000"/>
-                </a:solidFill>
-              </a:rPr>
-              <a:t>BEGIN</a:t>
-            </a:r>
-          </a:p>
-        </p:txBody>
-      </p:sp>
-      <p:sp>
-        <p:nvSpPr>
-          <p:cNvPr id="8" name="Subtitle 8">
-            <a:extLst>
-              <a:ext uri="{FF2B5EF4-FFF2-40B4-BE49-F238E27FC236}">
-                <a16:creationId xmlns:a16="http://schemas.microsoft.com/office/drawing/2014/main" id="{A055A16D-A8A0-3F4E-A40E-0DE76845C931}"/>
-              </a:ext>
-            </a:extLst>
-          </p:cNvPr>
+              <a:t>PRESS THE RIGHT BUTTON TO CONTINUE</a:t>
+            </a:r>
+          </a:p>
+        </p:txBody>
+      </p:sp>
+      <p:sp>
+        <p:nvSpPr>
+          <p:cNvPr id="12" name="Subtitle 8"/>
           <p:cNvSpPr txBox="1">
             <a:spLocks/>
           </p:cNvSpPr>
@@ -9231,8 +10000,8 @@
         </p:nvSpPr>
         <p:spPr>
           <a:xfrm>
-            <a:off x="8981486" y="3479952"/>
-            <a:ext cx="1258017" cy="631765"/>
+            <a:off x="9140345" y="6073844"/>
+            <a:ext cx="1532830" cy="801636"/>
           </a:xfrm>
           <a:prstGeom prst="rect">
             <a:avLst/>
@@ -9398,11 +10167,37 @@
             </a:lvl9pPr>
           </a:lstStyle>
           <a:p>
-            <a:r>
-              <a:rPr lang="en-US" sz="1600" dirty="0">
-                <a:solidFill>
-                  <a:schemeClr val="tx1"/>
-                </a:solidFill>
+            <a:pPr marL="0" marR="0" lvl="0" indent="0" algn="ctr" defTabSz="914400" rtl="0" eaLnBrk="1" fontAlgn="auto" latinLnBrk="0" hangingPunct="1">
+              <a:lnSpc>
+                <a:spcPct val="100000"/>
+              </a:lnSpc>
+              <a:spcBef>
+                <a:spcPct val="20000"/>
+              </a:spcBef>
+              <a:spcAft>
+                <a:spcPts val="0"/>
+              </a:spcAft>
+              <a:buClrTx/>
+              <a:buSzTx/>
+              <a:buFont typeface="Arial" pitchFamily="34" charset="0"/>
+              <a:buNone/>
+              <a:tabLst/>
+              <a:defRPr/>
+            </a:pPr>
+            <a:r>
+              <a:rPr kumimoji="0" lang="en-US" sz="1600" b="0" i="0" u="none" strike="noStrike" kern="1200" cap="none" spc="0" normalizeH="0" baseline="0" noProof="0" dirty="0">
+                <a:ln>
+                  <a:noFill/>
+                </a:ln>
+                <a:solidFill>
+                  <a:prstClr val="white"/>
+                </a:solidFill>
+                <a:effectLst/>
+                <a:uLnTx/>
+                <a:uFillTx/>
+                <a:latin typeface="Calibri"/>
+                <a:ea typeface="+mn-ea"/>
+                <a:cs typeface="+mn-cs"/>
               </a:rPr>
               <a:t>RIGHT</a:t>
             </a:r>
@@ -9411,20 +10206,14 @@
       </p:sp>
       <p:sp>
         <p:nvSpPr>
-          <p:cNvPr id="9" name="Right Arrow 8">
-            <a:extLst>
-              <a:ext uri="{FF2B5EF4-FFF2-40B4-BE49-F238E27FC236}">
-                <a16:creationId xmlns:a16="http://schemas.microsoft.com/office/drawing/2014/main" id="{ECC5C2B7-F559-DC43-B8E3-A629B8848CFA}"/>
-              </a:ext>
-            </a:extLst>
-          </p:cNvPr>
+          <p:cNvPr id="13" name="Right Arrow 12"/>
           <p:cNvSpPr/>
           <p:nvPr/>
         </p:nvSpPr>
         <p:spPr>
           <a:xfrm>
-            <a:off x="9143283" y="3644440"/>
-            <a:ext cx="1258017" cy="631765"/>
+            <a:off x="9637318" y="6391827"/>
+            <a:ext cx="640200" cy="289763"/>
           </a:xfrm>
           <a:prstGeom prst="rightArrow">
             <a:avLst/>
@@ -9454,15 +10243,122 @@
           <a:bodyPr rtlCol="0" anchor="ctr"/>
           <a:lstStyle/>
           <a:p>
-            <a:pPr algn="ctr"/>
-            <a:endParaRPr lang="en-US"/>
+            <a:pPr marL="0" marR="0" lvl="0" indent="0" algn="ctr" defTabSz="457200" rtl="0" eaLnBrk="1" fontAlgn="auto" latinLnBrk="0" hangingPunct="1">
+              <a:lnSpc>
+                <a:spcPct val="100000"/>
+              </a:lnSpc>
+              <a:spcBef>
+                <a:spcPts val="0"/>
+              </a:spcBef>
+              <a:spcAft>
+                <a:spcPts val="0"/>
+              </a:spcAft>
+              <a:buClrTx/>
+              <a:buSzTx/>
+              <a:buFontTx/>
+              <a:buNone/>
+              <a:tabLst/>
+              <a:defRPr/>
+            </a:pPr>
+            <a:endParaRPr kumimoji="0" lang="en-US" sz="1800" b="0" i="0" u="none" strike="noStrike" kern="1200" cap="none" spc="0" normalizeH="0" baseline="0" noProof="0">
+              <a:ln>
+                <a:noFill/>
+              </a:ln>
+              <a:solidFill>
+                <a:prstClr val="white"/>
+              </a:solidFill>
+              <a:effectLst/>
+              <a:uLnTx/>
+              <a:uFillTx/>
+              <a:latin typeface="Calibri"/>
+              <a:ea typeface="+mn-ea"/>
+              <a:cs typeface="+mn-cs"/>
+            </a:endParaRPr>
+          </a:p>
+        </p:txBody>
+      </p:sp>
+      <p:sp>
+        <p:nvSpPr>
+          <p:cNvPr id="15" name="Content Placeholder 2">
+            <a:extLst>
+              <a:ext uri="{FF2B5EF4-FFF2-40B4-BE49-F238E27FC236}">
+                <a16:creationId xmlns:a16="http://schemas.microsoft.com/office/drawing/2014/main" id="{BB089F57-6179-B14E-8148-2009637B51FB}"/>
+              </a:ext>
+            </a:extLst>
+          </p:cNvPr>
+          <p:cNvSpPr>
+            <a:spLocks noGrp="1"/>
+          </p:cNvSpPr>
+          <p:nvPr>
+            <p:ph idx="1"/>
+          </p:nvPr>
+        </p:nvSpPr>
+        <p:spPr>
+          <a:xfrm>
+            <a:off x="2131807" y="1489416"/>
+            <a:ext cx="7928386" cy="1463040"/>
+          </a:xfrm>
+        </p:spPr>
+        <p:txBody>
+          <a:bodyPr>
+            <a:noAutofit/>
+          </a:bodyPr>
+          <a:lstStyle/>
+          <a:p>
+            <a:pPr marL="0" indent="0">
+              <a:buNone/>
+            </a:pPr>
+            <a:r>
+              <a:rPr lang="en-US" dirty="0"/>
+              <a:t>You are now ready to do the task. Remember, try to be </a:t>
+            </a:r>
+            <a:r>
+              <a:rPr lang="en-US" u="sng" dirty="0"/>
+              <a:t>as fast and accurate as possible</a:t>
+            </a:r>
+            <a:r>
+              <a:rPr lang="en-US" dirty="0"/>
+              <a:t>. Also try to </a:t>
+            </a:r>
+            <a:r>
+              <a:rPr lang="en-US" u="sng" dirty="0"/>
+              <a:t>respond on every trial</a:t>
+            </a:r>
+            <a:r>
+              <a:rPr lang="en-US" dirty="0"/>
+              <a:t>.</a:t>
+            </a:r>
+          </a:p>
+          <a:p>
+            <a:pPr marL="0" indent="0">
+              <a:buNone/>
+            </a:pPr>
+            <a:endParaRPr lang="en-US" dirty="0"/>
+          </a:p>
+          <a:p>
+            <a:pPr marL="0" indent="0">
+              <a:buNone/>
+            </a:pPr>
+            <a:r>
+              <a:rPr lang="en-US" dirty="0"/>
+              <a:t>To help you get comfortable with this task,</a:t>
+            </a:r>
+          </a:p>
+          <a:p>
+            <a:pPr marL="0" indent="0">
+              <a:buNone/>
+            </a:pPr>
+            <a:r>
+              <a:rPr lang="en-US" dirty="0"/>
+              <a:t>let’s do a few practice trials first.</a:t>
+            </a:r>
           </a:p>
         </p:txBody>
       </p:sp>
     </p:spTree>
     <p:extLst>
       <p:ext uri="{BB962C8B-B14F-4D97-AF65-F5344CB8AC3E}">
-        <p14:creationId xmlns:p14="http://schemas.microsoft.com/office/powerpoint/2010/main" val="3361022600"/>
+        <p14:creationId xmlns:p14="http://schemas.microsoft.com/office/powerpoint/2010/main" val="391538907"/>
       </p:ext>
     </p:extLst>
   </p:cSld>

</xml_diff>